<commit_message>
update details of best approach
</commit_message>
<xml_diff>
--- a/allstate-presentation.pptx
+++ b/allstate-presentation.pptx
@@ -322,7 +322,7 @@
           <a:p>
             <a:fld id="{AE2B17A4-3277-4DA1-8203-626B1179662A}" type="datetimeFigureOut">
               <a:rPr lang="en-US" smtClean="0"/>
-              <a:t>5/18/2014</a:t>
+              <a:t>5/19/2014</a:t>
             </a:fld>
             <a:endParaRPr lang="en-US"/>
           </a:p>
@@ -492,7 +492,7 @@
           <a:p>
             <a:fld id="{AE2B17A4-3277-4DA1-8203-626B1179662A}" type="datetimeFigureOut">
               <a:rPr lang="en-US" smtClean="0"/>
-              <a:t>5/18/2014</a:t>
+              <a:t>5/19/2014</a:t>
             </a:fld>
             <a:endParaRPr lang="en-US"/>
           </a:p>
@@ -672,7 +672,7 @@
           <a:p>
             <a:fld id="{AE2B17A4-3277-4DA1-8203-626B1179662A}" type="datetimeFigureOut">
               <a:rPr lang="en-US" smtClean="0"/>
-              <a:t>5/18/2014</a:t>
+              <a:t>5/19/2014</a:t>
             </a:fld>
             <a:endParaRPr lang="en-US"/>
           </a:p>
@@ -842,7 +842,7 @@
           <a:p>
             <a:fld id="{AE2B17A4-3277-4DA1-8203-626B1179662A}" type="datetimeFigureOut">
               <a:rPr lang="en-US" smtClean="0"/>
-              <a:t>5/18/2014</a:t>
+              <a:t>5/19/2014</a:t>
             </a:fld>
             <a:endParaRPr lang="en-US"/>
           </a:p>
@@ -1088,7 +1088,7 @@
           <a:p>
             <a:fld id="{AE2B17A4-3277-4DA1-8203-626B1179662A}" type="datetimeFigureOut">
               <a:rPr lang="en-US" smtClean="0"/>
-              <a:t>5/18/2014</a:t>
+              <a:t>5/19/2014</a:t>
             </a:fld>
             <a:endParaRPr lang="en-US"/>
           </a:p>
@@ -1376,7 +1376,7 @@
           <a:p>
             <a:fld id="{AE2B17A4-3277-4DA1-8203-626B1179662A}" type="datetimeFigureOut">
               <a:rPr lang="en-US" smtClean="0"/>
-              <a:t>5/18/2014</a:t>
+              <a:t>5/19/2014</a:t>
             </a:fld>
             <a:endParaRPr lang="en-US"/>
           </a:p>
@@ -1798,7 +1798,7 @@
           <a:p>
             <a:fld id="{AE2B17A4-3277-4DA1-8203-626B1179662A}" type="datetimeFigureOut">
               <a:rPr lang="en-US" smtClean="0"/>
-              <a:t>5/18/2014</a:t>
+              <a:t>5/19/2014</a:t>
             </a:fld>
             <a:endParaRPr lang="en-US"/>
           </a:p>
@@ -1916,7 +1916,7 @@
           <a:p>
             <a:fld id="{AE2B17A4-3277-4DA1-8203-626B1179662A}" type="datetimeFigureOut">
               <a:rPr lang="en-US" smtClean="0"/>
-              <a:t>5/18/2014</a:t>
+              <a:t>5/19/2014</a:t>
             </a:fld>
             <a:endParaRPr lang="en-US"/>
           </a:p>
@@ -2011,7 +2011,7 @@
           <a:p>
             <a:fld id="{AE2B17A4-3277-4DA1-8203-626B1179662A}" type="datetimeFigureOut">
               <a:rPr lang="en-US" smtClean="0"/>
-              <a:t>5/18/2014</a:t>
+              <a:t>5/19/2014</a:t>
             </a:fld>
             <a:endParaRPr lang="en-US"/>
           </a:p>
@@ -2288,7 +2288,7 @@
           <a:p>
             <a:fld id="{AE2B17A4-3277-4DA1-8203-626B1179662A}" type="datetimeFigureOut">
               <a:rPr lang="en-US" smtClean="0"/>
-              <a:t>5/18/2014</a:t>
+              <a:t>5/19/2014</a:t>
             </a:fld>
             <a:endParaRPr lang="en-US"/>
           </a:p>
@@ -2541,7 +2541,7 @@
           <a:p>
             <a:fld id="{AE2B17A4-3277-4DA1-8203-626B1179662A}" type="datetimeFigureOut">
               <a:rPr lang="en-US" smtClean="0"/>
-              <a:t>5/18/2014</a:t>
+              <a:t>5/19/2014</a:t>
             </a:fld>
             <a:endParaRPr lang="en-US"/>
           </a:p>
@@ -2754,7 +2754,7 @@
           <a:p>
             <a:fld id="{AE2B17A4-3277-4DA1-8203-626B1179662A}" type="datetimeFigureOut">
               <a:rPr lang="en-US" smtClean="0"/>
-              <a:t>5/18/2014</a:t>
+              <a:t>5/19/2014</a:t>
             </a:fld>
             <a:endParaRPr lang="en-US"/>
           </a:p>
@@ -3253,15 +3253,7 @@
           <a:p>
             <a:r>
               <a:rPr lang="en-US" dirty="0" smtClean="0"/>
-              <a:t>Data to the </a:t>
-            </a:r>
-            <a:r>
-              <a:rPr lang="en-US" dirty="0" smtClean="0"/>
-              <a:t>rescue</a:t>
-            </a:r>
-            <a:r>
-              <a:rPr lang="en-US" dirty="0" smtClean="0"/>
-              <a:t>!</a:t>
+              <a:t>Data to the rescue!</a:t>
             </a:r>
             <a:endParaRPr lang="en-US" dirty="0"/>
           </a:p>
@@ -4097,13 +4089,8 @@
           <a:p>
             <a:r>
               <a:rPr lang="en-US" dirty="0" smtClean="0"/>
-              <a:t>Create a list of “rules” about pairs of </a:t>
-            </a:r>
-            <a:r>
-              <a:rPr lang="en-US" dirty="0" smtClean="0"/>
-              <a:t>options, and use these rules to “fix” the baseline predictions</a:t>
-            </a:r>
-            <a:endParaRPr lang="en-US" dirty="0" smtClean="0"/>
+              <a:t>Create a list of “rules” about pairs of options, and use these rules to “fix” the baseline predictions</a:t>
+            </a:r>
           </a:p>
           <a:p>
             <a:pPr lvl="1"/>
@@ -4115,11 +4102,7 @@
           <a:p>
             <a:r>
               <a:rPr lang="en-US" dirty="0" smtClean="0"/>
-              <a:t>Result</a:t>
-            </a:r>
-            <a:r>
-              <a:rPr lang="en-US" dirty="0" smtClean="0"/>
-              <a:t>: Worse than naïve approach!</a:t>
+              <a:t>Result: Worse than naïve approach!</a:t>
             </a:r>
           </a:p>
         </p:txBody>
@@ -4305,15 +4288,7 @@
           <a:p>
             <a:r>
               <a:rPr lang="en-US" dirty="0" smtClean="0"/>
-              <a:t>New </a:t>
-            </a:r>
-            <a:r>
-              <a:rPr lang="en-US" dirty="0" smtClean="0"/>
-              <a:t>strategy</a:t>
-            </a:r>
-            <a:r>
-              <a:rPr lang="en-US" dirty="0" smtClean="0"/>
-              <a:t>: Model stacking</a:t>
+              <a:t>New strategy: Model stacking</a:t>
             </a:r>
             <a:endParaRPr lang="en-US" dirty="0"/>
           </a:p>
@@ -4662,15 +4637,7 @@
           <a:p>
             <a:r>
               <a:rPr lang="en-US" dirty="0" smtClean="0"/>
-              <a:t>What is the </a:t>
-            </a:r>
-            <a:r>
-              <a:rPr lang="en-US" dirty="0" smtClean="0"/>
-              <a:t>competition goal</a:t>
-            </a:r>
-            <a:r>
-              <a:rPr lang="en-US" dirty="0" smtClean="0"/>
-              <a:t>?</a:t>
+              <a:t>What is the competition goal?</a:t>
             </a:r>
           </a:p>
           <a:p>
@@ -4771,11 +4738,7 @@
           <a:p>
             <a:r>
               <a:rPr lang="en-US" dirty="0" smtClean="0"/>
-              <a:t>Feature </a:t>
-            </a:r>
-            <a:r>
-              <a:rPr lang="en-US" dirty="0" smtClean="0"/>
-              <a:t>engineering to the rescue!</a:t>
+              <a:t>Feature engineering to the rescue!</a:t>
             </a:r>
             <a:endParaRPr lang="en-US" dirty="0"/>
           </a:p>
@@ -4907,11 +4870,7 @@
           <a:p>
             <a:r>
               <a:rPr lang="en-US" dirty="0" smtClean="0"/>
-              <a:t>Feature </a:t>
-            </a:r>
-            <a:r>
-              <a:rPr lang="en-US" dirty="0" smtClean="0"/>
-              <a:t>engineering</a:t>
+              <a:t>Feature engineering</a:t>
             </a:r>
             <a:endParaRPr lang="en-US" dirty="0"/>
           </a:p>
@@ -5068,11 +5027,7 @@
           <a:p>
             <a:r>
               <a:rPr lang="en-US" dirty="0" smtClean="0"/>
-              <a:t>Feature </a:t>
-            </a:r>
-            <a:r>
-              <a:rPr lang="en-US" dirty="0" smtClean="0"/>
-              <a:t>engineering</a:t>
+              <a:t>Feature engineering</a:t>
             </a:r>
             <a:endParaRPr lang="en-US" dirty="0"/>
           </a:p>
@@ -5192,11 +5147,7 @@
           <a:p>
             <a:r>
               <a:rPr lang="en-US" dirty="0" smtClean="0"/>
-              <a:t>Step </a:t>
-            </a:r>
-            <a:r>
-              <a:rPr lang="en-US" dirty="0" smtClean="0"/>
-              <a:t>1 (</a:t>
+              <a:t>Step 1 (</a:t>
             </a:r>
             <a:r>
               <a:rPr lang="en-US" dirty="0" err="1" smtClean="0"/>
@@ -5204,11 +5155,7 @@
             </a:r>
             <a:r>
               <a:rPr lang="en-US" dirty="0" smtClean="0"/>
-              <a:t>): </a:t>
-            </a:r>
-            <a:r>
-              <a:rPr lang="en-US" dirty="0" smtClean="0"/>
-              <a:t>Predict who will change</a:t>
+              <a:t>): Predict who will change</a:t>
             </a:r>
             <a:endParaRPr lang="en-US" dirty="0"/>
           </a:p>
@@ -5414,11 +5361,7 @@
           <a:p>
             <a:r>
               <a:rPr lang="en-US" dirty="0" smtClean="0"/>
-              <a:t>New </a:t>
-            </a:r>
-            <a:r>
-              <a:rPr lang="en-US" dirty="0" smtClean="0"/>
-              <a:t>strategy: Precision not accuracy</a:t>
+              <a:t>New strategy: Precision not accuracy</a:t>
             </a:r>
             <a:endParaRPr lang="en-US" dirty="0"/>
           </a:p>
@@ -5467,11 +5410,7 @@
             <a:pPr lvl="1"/>
             <a:r>
               <a:rPr lang="en-US" dirty="0" smtClean="0"/>
-              <a:t>Thus: </a:t>
-            </a:r>
-            <a:r>
-              <a:rPr lang="en-US" dirty="0" smtClean="0"/>
-              <a:t>minimize false positives by setting a high probability threshold</a:t>
+              <a:t>Thus: minimize false positives by setting a high probability threshold</a:t>
             </a:r>
           </a:p>
           <a:p>
@@ -5484,31 +5423,7 @@
             <a:pPr lvl="1"/>
             <a:r>
               <a:rPr lang="en-US" dirty="0" smtClean="0"/>
-              <a:t>In</a:t>
-            </a:r>
-            <a:r>
-              <a:rPr lang="en-US" dirty="0" smtClean="0"/>
-              <a:t> </a:t>
-            </a:r>
-            <a:r>
-              <a:rPr lang="en-US" dirty="0" smtClean="0"/>
-              <a:t>test </a:t>
-            </a:r>
-            <a:r>
-              <a:rPr lang="en-US" dirty="0" smtClean="0"/>
-              <a:t>set, about </a:t>
-            </a:r>
-            <a:r>
-              <a:rPr lang="en-US" dirty="0" smtClean="0"/>
-              <a:t>25,000 customers will change </a:t>
-            </a:r>
-            <a:r>
-              <a:rPr lang="en-US" dirty="0" smtClean="0"/>
-              <a:t>options after their final </a:t>
-            </a:r>
-            <a:r>
-              <a:rPr lang="en-US" dirty="0" smtClean="0"/>
-              <a:t>quote</a:t>
+              <a:t>In test set, about 25,000 customers will change options after their final quote</a:t>
             </a:r>
           </a:p>
           <a:p>
@@ -5601,27 +5516,14 @@
           <a:p>
             <a:r>
               <a:rPr lang="en-US" dirty="0" smtClean="0"/>
-              <a:t>Created a cross-validation framework to predict the test set precision </a:t>
-            </a:r>
-            <a:r>
-              <a:rPr lang="en-US" dirty="0" smtClean="0"/>
-              <a:t>of </a:t>
-            </a:r>
-            <a:r>
-              <a:rPr lang="en-US" dirty="0" smtClean="0"/>
-              <a:t>my model</a:t>
-            </a:r>
-          </a:p>
-          <a:p>
-            <a:r>
-              <a:rPr lang="en-US" dirty="0" smtClean="0"/>
-              <a:t>Tuned the probability threshold for predicting change to </a:t>
-            </a:r>
-            <a:r>
-              <a:rPr lang="en-US" dirty="0" smtClean="0"/>
-              <a:t>0.85 (rather than 0.50)</a:t>
-            </a:r>
-            <a:endParaRPr lang="en-US" dirty="0" smtClean="0"/>
+              <a:t>Created a cross-validation framework to predict the test set precision of my model</a:t>
+            </a:r>
+          </a:p>
+          <a:p>
+            <a:r>
+              <a:rPr lang="en-US" dirty="0" smtClean="0"/>
+              <a:t>Tuned the probability threshold for predicting change to 0.85 (rather than 0.50)</a:t>
+            </a:r>
           </a:p>
           <a:p>
             <a:pPr lvl="1"/>
@@ -5934,21 +5836,8 @@
             </a:r>
             <a:r>
               <a:rPr lang="en-US" dirty="0" smtClean="0"/>
-              <a:t> using </a:t>
-            </a:r>
-            <a:r>
-              <a:rPr lang="en-US" dirty="0" smtClean="0"/>
-              <a:t>my </a:t>
-            </a:r>
-            <a:r>
-              <a:rPr lang="en-US" dirty="0" smtClean="0"/>
-              <a:t>list of “rules” about unlikely </a:t>
-            </a:r>
-            <a:r>
-              <a:rPr lang="en-US" dirty="0" smtClean="0"/>
-              <a:t>combinations</a:t>
-            </a:r>
-            <a:endParaRPr lang="en-US" dirty="0" smtClean="0"/>
+              <a:t> using my list of “rules” about unlikely combinations</a:t>
+            </a:r>
           </a:p>
           <a:p>
             <a:pPr lvl="1"/>
@@ -5966,11 +5855,7 @@
           <a:p>
             <a:r>
               <a:rPr lang="en-US" dirty="0" smtClean="0"/>
-              <a:t>Result: No </a:t>
-            </a:r>
-            <a:r>
-              <a:rPr lang="en-US" dirty="0" smtClean="0"/>
-              <a:t>improvement over the baseline</a:t>
+              <a:t>Result: No improvement over the baseline</a:t>
             </a:r>
             <a:endParaRPr lang="en-US" dirty="0"/>
           </a:p>
@@ -6089,11 +5974,7 @@
           <a:p>
             <a:r>
               <a:rPr lang="en-US" dirty="0" smtClean="0"/>
-              <a:t>Note: This </a:t>
-            </a:r>
-            <a:r>
-              <a:rPr lang="en-US" dirty="0" smtClean="0"/>
-              <a:t>approach ignores all customer data!</a:t>
+              <a:t>Note: This approach ignores all customer data!</a:t>
             </a:r>
             <a:endParaRPr lang="en-US" dirty="0"/>
           </a:p>
@@ -6153,15 +6034,7 @@
           <a:p>
             <a:r>
               <a:rPr lang="en-US" dirty="0" smtClean="0"/>
-              <a:t>What is the </a:t>
-            </a:r>
-            <a:r>
-              <a:rPr lang="en-US" dirty="0" smtClean="0"/>
-              <a:t>competition goal</a:t>
-            </a:r>
-            <a:r>
-              <a:rPr lang="en-US" dirty="0" smtClean="0"/>
-              <a:t>?</a:t>
+              <a:t>What is the competition goal?</a:t>
             </a:r>
             <a:endParaRPr lang="en-US" dirty="0"/>
           </a:p>
@@ -6302,7 +6175,6 @@
               <a:rPr lang="en-US" dirty="0" smtClean="0"/>
               <a:t>Determine which plans are “unlikely”</a:t>
             </a:r>
-            <a:endParaRPr lang="en-US" dirty="0" smtClean="0"/>
           </a:p>
           <a:p>
             <a:pPr lvl="1"/>
@@ -6312,23 +6184,15 @@
             </a:r>
             <a:r>
               <a:rPr lang="en-US" b="1" dirty="0" smtClean="0"/>
-              <a:t>view </a:t>
+              <a:t>view count</a:t>
+            </a:r>
+            <a:r>
+              <a:rPr lang="en-US" dirty="0" smtClean="0"/>
+              <a:t> and </a:t>
             </a:r>
             <a:r>
               <a:rPr lang="en-US" b="1" dirty="0" smtClean="0"/>
-              <a:t>count</a:t>
-            </a:r>
-            <a:r>
-              <a:rPr lang="en-US" dirty="0" smtClean="0"/>
-              <a:t> and </a:t>
-            </a:r>
-            <a:r>
-              <a:rPr lang="en-US" b="1" dirty="0" smtClean="0"/>
-              <a:t>purchase </a:t>
-            </a:r>
-            <a:r>
-              <a:rPr lang="en-US" b="1" dirty="0" smtClean="0"/>
-              <a:t>likelihood</a:t>
+              <a:t>purchase likelihood</a:t>
             </a:r>
             <a:r>
               <a:rPr lang="en-US" dirty="0"/>
@@ -6338,27 +6202,18 @@
               <a:rPr lang="en-US" dirty="0" smtClean="0"/>
               <a:t>for every plan and set threshold values</a:t>
             </a:r>
-            <a:endParaRPr lang="en-US" dirty="0" smtClean="0"/>
-          </a:p>
-          <a:p>
-            <a:r>
-              <a:rPr lang="en-US" dirty="0" smtClean="0"/>
-              <a:t>Determine the best replacement plan for each unlikely </a:t>
-            </a:r>
-            <a:r>
-              <a:rPr lang="en-US" dirty="0" smtClean="0"/>
-              <a:t>plan</a:t>
+          </a:p>
+          <a:p>
+            <a:r>
+              <a:rPr lang="en-US" dirty="0" smtClean="0"/>
+              <a:t>Determine the best replacement plan for each unlikely plan</a:t>
             </a:r>
           </a:p>
           <a:p>
             <a:pPr lvl="1"/>
             <a:r>
               <a:rPr lang="en-US" dirty="0" smtClean="0"/>
-              <a:t>Tally which </a:t>
-            </a:r>
-            <a:r>
-              <a:rPr lang="en-US" dirty="0" smtClean="0"/>
-              <a:t>plans were actually purchased by those who viewed them</a:t>
+              <a:t>Tally which plans were actually purchased by those who viewed them</a:t>
             </a:r>
           </a:p>
           <a:p>
@@ -6369,11 +6224,7 @@
             </a:r>
             <a:r>
               <a:rPr lang="en-US" b="1" dirty="0" smtClean="0"/>
-              <a:t>replacement plan </a:t>
-            </a:r>
-            <a:r>
-              <a:rPr lang="en-US" b="1" dirty="0" smtClean="0"/>
-              <a:t>commonality</a:t>
+              <a:t>replacement plan commonality</a:t>
             </a:r>
             <a:r>
               <a:rPr lang="en-US" dirty="0" smtClean="0"/>
@@ -6644,11 +6495,33 @@
           <a:p>
             <a:r>
               <a:rPr lang="en-US" dirty="0" smtClean="0"/>
-              <a:t>Change the plans on the left to the plans on the </a:t>
-            </a:r>
-            <a:r>
-              <a:rPr lang="en-US" dirty="0" smtClean="0"/>
-              <a:t>right:</a:t>
+              <a:t>If the plan on the left is predicted by the naïve approach, change it to the plan on </a:t>
+            </a:r>
+            <a:r>
+              <a:rPr lang="en-US" dirty="0" smtClean="0"/>
+              <a:t>the right</a:t>
+            </a:r>
+            <a:r>
+              <a:rPr lang="en-US" dirty="0" smtClean="0"/>
+              <a:t>:</a:t>
+            </a:r>
+          </a:p>
+          <a:p>
+            <a:endParaRPr lang="en-US" dirty="0"/>
+          </a:p>
+          <a:p>
+            <a:endParaRPr lang="en-US" dirty="0" smtClean="0"/>
+          </a:p>
+          <a:p>
+            <a:endParaRPr lang="en-US" dirty="0"/>
+          </a:p>
+          <a:p>
+            <a:endParaRPr lang="en-US" dirty="0" smtClean="0"/>
+          </a:p>
+          <a:p>
+            <a:r>
+              <a:rPr lang="en-US" dirty="0" smtClean="0"/>
+              <a:t>That’s all you have to do!</a:t>
             </a:r>
             <a:endParaRPr lang="en-US" dirty="0"/>
           </a:p>
@@ -6656,21 +6529,21 @@
       </p:sp>
       <p:graphicFrame>
         <p:nvGraphicFramePr>
-          <p:cNvPr id="4" name="Table 3"/>
+          <p:cNvPr id="6" name="Table 5"/>
           <p:cNvGraphicFramePr>
             <a:graphicFrameLocks noGrp="1"/>
           </p:cNvGraphicFramePr>
           <p:nvPr>
             <p:extLst>
               <p:ext uri="{D42A27DB-BD31-4B8C-83A1-F6EECF244321}">
-                <p14:modId xmlns:p14="http://schemas.microsoft.com/office/powerpoint/2010/main" val="220136824"/>
+                <p14:modId xmlns:p14="http://schemas.microsoft.com/office/powerpoint/2010/main" val="4156534850"/>
               </p:ext>
             </p:extLst>
           </p:nvPr>
         </p:nvGraphicFramePr>
         <p:xfrm>
-          <a:off x="1828800" y="2590800"/>
-          <a:ext cx="2133600" cy="3667125"/>
+          <a:off x="1676400" y="2743200"/>
+          <a:ext cx="2133600" cy="2000250"/>
         </p:xfrm>
         <a:graphic>
           <a:graphicData uri="http://schemas.openxmlformats.org/drawingml/2006/table">
@@ -6695,12 +6568,12 @@
                     <a:p>
                       <a:pPr algn="l" fontAlgn="b"/>
                       <a:r>
-                        <a:rPr lang="en-US" sz="2000" u="none" strike="noStrike" dirty="0">
+                        <a:rPr lang="en-US" sz="2000" u="none" strike="noStrike">
                           <a:effectLst/>
                         </a:rPr>
                         <a:t>A</a:t>
                       </a:r>
-                      <a:endParaRPr lang="en-US" sz="2000" b="0" i="0" u="none" strike="noStrike" dirty="0">
+                      <a:endParaRPr lang="en-US" sz="2000" b="0" i="0" u="none" strike="noStrike">
                         <a:solidFill>
                           <a:srgbClr val="000000"/>
                         </a:solidFill>
@@ -6907,7 +6780,7 @@
                         <a:rPr lang="en-US" sz="2000" u="none" strike="noStrike">
                           <a:effectLst/>
                         </a:rPr>
-                        <a:t>3</a:t>
+                        <a:t>1</a:t>
                       </a:r>
                       <a:endParaRPr lang="en-US" sz="2000" b="0" i="0" u="none" strike="noStrike">
                         <a:solidFill>
@@ -7024,52 +6897,6 @@
                         <a:rPr lang="en-US" sz="2000" u="none" strike="noStrike">
                           <a:effectLst/>
                         </a:rPr>
-                        <a:t>0</a:t>
-                      </a:r>
-                      <a:endParaRPr lang="en-US" sz="2000" b="0" i="0" u="none" strike="noStrike">
-                        <a:solidFill>
-                          <a:srgbClr val="000000"/>
-                        </a:solidFill>
-                        <a:effectLst/>
-                        <a:latin typeface="Calibri"/>
-                      </a:endParaRPr>
-                    </a:p>
-                  </a:txBody>
-                  <a:tcPr marL="9525" marR="9525" marT="9525" marB="0" anchor="b"/>
-                </a:tc>
-                <a:tc>
-                  <a:txBody>
-                    <a:bodyPr/>
-                    <a:lstStyle/>
-                    <a:p>
-                      <a:pPr algn="l" fontAlgn="b"/>
-                      <a:r>
-                        <a:rPr lang="en-US" sz="2000" u="none" strike="noStrike">
-                          <a:effectLst/>
-                        </a:rPr>
-                        <a:t>0</a:t>
-                      </a:r>
-                      <a:endParaRPr lang="en-US" sz="2000" b="0" i="0" u="none" strike="noStrike">
-                        <a:solidFill>
-                          <a:srgbClr val="000000"/>
-                        </a:solidFill>
-                        <a:effectLst/>
-                        <a:latin typeface="Calibri"/>
-                      </a:endParaRPr>
-                    </a:p>
-                  </a:txBody>
-                  <a:tcPr marL="9525" marR="9525" marT="9525" marB="0" anchor="b"/>
-                </a:tc>
-                <a:tc>
-                  <a:txBody>
-                    <a:bodyPr/>
-                    <a:lstStyle/>
-                    <a:p>
-                      <a:pPr algn="l" fontAlgn="b"/>
-                      <a:r>
-                        <a:rPr lang="en-US" sz="2000" u="none" strike="noStrike">
-                          <a:effectLst/>
-                        </a:rPr>
                         <a:t>1</a:t>
                       </a:r>
                       <a:endParaRPr lang="en-US" sz="2000" b="0" i="0" u="none" strike="noStrike">
@@ -7116,53 +6943,99 @@
                         <a:rPr lang="en-US" sz="2000" u="none" strike="noStrike">
                           <a:effectLst/>
                         </a:rPr>
-                        <a:t>0</a:t>
-                      </a:r>
-                      <a:endParaRPr lang="en-US" sz="2000" b="0" i="0" u="none" strike="noStrike">
-                        <a:solidFill>
-                          <a:srgbClr val="000000"/>
-                        </a:solidFill>
-                        <a:effectLst/>
-                        <a:latin typeface="Calibri"/>
-                      </a:endParaRPr>
-                    </a:p>
-                  </a:txBody>
-                  <a:tcPr marL="9525" marR="9525" marT="9525" marB="0" anchor="b"/>
-                </a:tc>
-                <a:tc>
-                  <a:txBody>
-                    <a:bodyPr/>
-                    <a:lstStyle/>
-                    <a:p>
-                      <a:pPr algn="l" fontAlgn="b"/>
-                      <a:r>
-                        <a:rPr lang="en-US" sz="2000" u="none" strike="noStrike">
-                          <a:effectLst/>
-                        </a:rPr>
-                        <a:t>0</a:t>
-                      </a:r>
-                      <a:endParaRPr lang="en-US" sz="2000" b="0" i="0" u="none" strike="noStrike">
-                        <a:solidFill>
-                          <a:srgbClr val="000000"/>
-                        </a:solidFill>
-                        <a:effectLst/>
-                        <a:latin typeface="Calibri"/>
-                      </a:endParaRPr>
-                    </a:p>
-                  </a:txBody>
-                  <a:tcPr marL="9525" marR="9525" marT="9525" marB="0" anchor="b"/>
-                </a:tc>
-                <a:tc>
-                  <a:txBody>
-                    <a:bodyPr/>
-                    <a:lstStyle/>
-                    <a:p>
-                      <a:pPr algn="l" fontAlgn="b"/>
-                      <a:r>
-                        <a:rPr lang="en-US" sz="2000" u="none" strike="noStrike">
-                          <a:effectLst/>
-                        </a:rPr>
-                        <a:t>4</a:t>
+                        <a:t>3</a:t>
+                      </a:r>
+                      <a:endParaRPr lang="en-US" sz="2000" b="0" i="0" u="none" strike="noStrike">
+                        <a:solidFill>
+                          <a:srgbClr val="000000"/>
+                        </a:solidFill>
+                        <a:effectLst/>
+                        <a:latin typeface="Calibri"/>
+                      </a:endParaRPr>
+                    </a:p>
+                  </a:txBody>
+                  <a:tcPr marL="9525" marR="9525" marT="9525" marB="0" anchor="b"/>
+                </a:tc>
+                <a:tc>
+                  <a:txBody>
+                    <a:bodyPr/>
+                    <a:lstStyle/>
+                    <a:p>
+                      <a:pPr algn="l" fontAlgn="b"/>
+                      <a:r>
+                        <a:rPr lang="en-US" sz="2000" u="none" strike="noStrike">
+                          <a:effectLst/>
+                        </a:rPr>
+                        <a:t>1</a:t>
+                      </a:r>
+                      <a:endParaRPr lang="en-US" sz="2000" b="0" i="0" u="none" strike="noStrike">
+                        <a:solidFill>
+                          <a:srgbClr val="000000"/>
+                        </a:solidFill>
+                        <a:effectLst/>
+                        <a:latin typeface="Calibri"/>
+                      </a:endParaRPr>
+                    </a:p>
+                  </a:txBody>
+                  <a:tcPr marL="9525" marR="9525" marT="9525" marB="0" anchor="b"/>
+                </a:tc>
+                <a:tc>
+                  <a:txBody>
+                    <a:bodyPr/>
+                    <a:lstStyle/>
+                    <a:p>
+                      <a:pPr algn="l" fontAlgn="b"/>
+                      <a:r>
+                        <a:rPr lang="en-US" sz="2000" u="none" strike="noStrike">
+                          <a:effectLst/>
+                        </a:rPr>
+                        <a:t>1</a:t>
+                      </a:r>
+                      <a:endParaRPr lang="en-US" sz="2000" b="0" i="0" u="none" strike="noStrike">
+                        <a:solidFill>
+                          <a:srgbClr val="000000"/>
+                        </a:solidFill>
+                        <a:effectLst/>
+                        <a:latin typeface="Calibri"/>
+                      </a:endParaRPr>
+                    </a:p>
+                  </a:txBody>
+                  <a:tcPr marL="9525" marR="9525" marT="9525" marB="0" anchor="b"/>
+                </a:tc>
+                <a:tc>
+                  <a:txBody>
+                    <a:bodyPr/>
+                    <a:lstStyle/>
+                    <a:p>
+                      <a:pPr algn="l" fontAlgn="b"/>
+                      <a:r>
+                        <a:rPr lang="en-US" sz="2000" u="none" strike="noStrike">
+                          <a:effectLst/>
+                        </a:rPr>
+                        <a:t>2</a:t>
+                      </a:r>
+                      <a:endParaRPr lang="en-US" sz="2000" b="0" i="0" u="none" strike="noStrike">
+                        <a:solidFill>
+                          <a:srgbClr val="000000"/>
+                        </a:solidFill>
+                        <a:effectLst/>
+                        <a:latin typeface="Calibri"/>
+                      </a:endParaRPr>
+                    </a:p>
+                  </a:txBody>
+                  <a:tcPr marL="9525" marR="9525" marT="9525" marB="0" anchor="b"/>
+                </a:tc>
+                <a:tc>
+                  <a:txBody>
+                    <a:bodyPr/>
+                    <a:lstStyle/>
+                    <a:p>
+                      <a:pPr algn="l" fontAlgn="b"/>
+                      <a:r>
+                        <a:rPr lang="en-US" sz="2000" u="none" strike="noStrike">
+                          <a:effectLst/>
+                        </a:rPr>
+                        <a:t>2</a:t>
                       </a:r>
                       <a:endParaRPr lang="en-US" sz="2000" b="0" i="0" u="none" strike="noStrike">
                         <a:solidFill>
@@ -7210,6 +7083,29 @@
                         <a:rPr lang="en-US" sz="2000" u="none" strike="noStrike">
                           <a:effectLst/>
                         </a:rPr>
+                        <a:t>0</a:t>
+                      </a:r>
+                      <a:endParaRPr lang="en-US" sz="2000" b="0" i="0" u="none" strike="noStrike">
+                        <a:solidFill>
+                          <a:srgbClr val="000000"/>
+                        </a:solidFill>
+                        <a:effectLst/>
+                        <a:latin typeface="Calibri"/>
+                      </a:endParaRPr>
+                    </a:p>
+                  </a:txBody>
+                  <a:tcPr marL="9525" marR="9525" marT="9525" marB="0" anchor="b"/>
+                </a:tc>
+                <a:tc>
+                  <a:txBody>
+                    <a:bodyPr/>
+                    <a:lstStyle/>
+                    <a:p>
+                      <a:pPr algn="l" fontAlgn="b"/>
+                      <a:r>
+                        <a:rPr lang="en-US" sz="2000" u="none" strike="noStrike">
+                          <a:effectLst/>
+                        </a:rPr>
                         <a:t>1</a:t>
                       </a:r>
                       <a:endParaRPr lang="en-US" sz="2000" b="0" i="0" u="none" strike="noStrike">
@@ -7233,29 +7129,6 @@
                         <a:rPr lang="en-US" sz="2000" u="none" strike="noStrike">
                           <a:effectLst/>
                         </a:rPr>
-                        <a:t>3</a:t>
-                      </a:r>
-                      <a:endParaRPr lang="en-US" sz="2000" b="0" i="0" u="none" strike="noStrike">
-                        <a:solidFill>
-                          <a:srgbClr val="000000"/>
-                        </a:solidFill>
-                        <a:effectLst/>
-                        <a:latin typeface="Calibri"/>
-                      </a:endParaRPr>
-                    </a:p>
-                  </a:txBody>
-                  <a:tcPr marL="9525" marR="9525" marT="9525" marB="0" anchor="b"/>
-                </a:tc>
-                <a:tc>
-                  <a:txBody>
-                    <a:bodyPr/>
-                    <a:lstStyle/>
-                    <a:p>
-                      <a:pPr algn="l" fontAlgn="b"/>
-                      <a:r>
-                        <a:rPr lang="en-US" sz="2000" u="none" strike="noStrike">
-                          <a:effectLst/>
-                        </a:rPr>
                         <a:t>1</a:t>
                       </a:r>
                       <a:endParaRPr lang="en-US" sz="2000" b="0" i="0" u="none" strike="noStrike">
@@ -7279,53 +7152,53 @@
                         <a:rPr lang="en-US" sz="2000" u="none" strike="noStrike">
                           <a:effectLst/>
                         </a:rPr>
-                        <a:t>1</a:t>
-                      </a:r>
-                      <a:endParaRPr lang="en-US" sz="2000" b="0" i="0" u="none" strike="noStrike">
-                        <a:solidFill>
-                          <a:srgbClr val="000000"/>
-                        </a:solidFill>
-                        <a:effectLst/>
-                        <a:latin typeface="Calibri"/>
-                      </a:endParaRPr>
-                    </a:p>
-                  </a:txBody>
-                  <a:tcPr marL="9525" marR="9525" marT="9525" marB="0" anchor="b"/>
-                </a:tc>
-                <a:tc>
-                  <a:txBody>
-                    <a:bodyPr/>
-                    <a:lstStyle/>
-                    <a:p>
-                      <a:pPr algn="l" fontAlgn="b"/>
-                      <a:r>
-                        <a:rPr lang="en-US" sz="2000" u="none" strike="noStrike">
-                          <a:effectLst/>
-                        </a:rPr>
-                        <a:t>2</a:t>
-                      </a:r>
-                      <a:endParaRPr lang="en-US" sz="2000" b="0" i="0" u="none" strike="noStrike">
-                        <a:solidFill>
-                          <a:srgbClr val="000000"/>
-                        </a:solidFill>
-                        <a:effectLst/>
-                        <a:latin typeface="Calibri"/>
-                      </a:endParaRPr>
-                    </a:p>
-                  </a:txBody>
-                  <a:tcPr marL="9525" marR="9525" marT="9525" marB="0" anchor="b"/>
-                </a:tc>
-                <a:tc>
-                  <a:txBody>
-                    <a:bodyPr/>
-                    <a:lstStyle/>
-                    <a:p>
-                      <a:pPr algn="l" fontAlgn="b"/>
-                      <a:r>
-                        <a:rPr lang="en-US" sz="2000" u="none" strike="noStrike">
-                          <a:effectLst/>
-                        </a:rPr>
-                        <a:t>2</a:t>
+                        <a:t>0</a:t>
+                      </a:r>
+                      <a:endParaRPr lang="en-US" sz="2000" b="0" i="0" u="none" strike="noStrike">
+                        <a:solidFill>
+                          <a:srgbClr val="000000"/>
+                        </a:solidFill>
+                        <a:effectLst/>
+                        <a:latin typeface="Calibri"/>
+                      </a:endParaRPr>
+                    </a:p>
+                  </a:txBody>
+                  <a:tcPr marL="9525" marR="9525" marT="9525" marB="0" anchor="b"/>
+                </a:tc>
+                <a:tc>
+                  <a:txBody>
+                    <a:bodyPr/>
+                    <a:lstStyle/>
+                    <a:p>
+                      <a:pPr algn="l" fontAlgn="b"/>
+                      <a:r>
+                        <a:rPr lang="en-US" sz="2000" u="none" strike="noStrike">
+                          <a:effectLst/>
+                        </a:rPr>
+                        <a:t>0</a:t>
+                      </a:r>
+                      <a:endParaRPr lang="en-US" sz="2000" b="0" i="0" u="none" strike="noStrike">
+                        <a:solidFill>
+                          <a:srgbClr val="000000"/>
+                        </a:solidFill>
+                        <a:effectLst/>
+                        <a:latin typeface="Calibri"/>
+                      </a:endParaRPr>
+                    </a:p>
+                  </a:txBody>
+                  <a:tcPr marL="9525" marR="9525" marT="9525" marB="0" anchor="b"/>
+                </a:tc>
+                <a:tc>
+                  <a:txBody>
+                    <a:bodyPr/>
+                    <a:lstStyle/>
+                    <a:p>
+                      <a:pPr algn="l" fontAlgn="b"/>
+                      <a:r>
+                        <a:rPr lang="en-US" sz="2000" u="none" strike="noStrike">
+                          <a:effectLst/>
+                        </a:rPr>
+                        <a:t>4</a:t>
                       </a:r>
                       <a:endParaRPr lang="en-US" sz="2000" b="0" i="0" u="none" strike="noStrike">
                         <a:solidFill>
@@ -7350,6 +7223,52 @@
                         <a:rPr lang="en-US" sz="2000" u="none" strike="noStrike">
                           <a:effectLst/>
                         </a:rPr>
+                        <a:t>0</a:t>
+                      </a:r>
+                      <a:endParaRPr lang="en-US" sz="2000" b="0" i="0" u="none" strike="noStrike">
+                        <a:solidFill>
+                          <a:srgbClr val="000000"/>
+                        </a:solidFill>
+                        <a:effectLst/>
+                        <a:latin typeface="Calibri"/>
+                      </a:endParaRPr>
+                    </a:p>
+                  </a:txBody>
+                  <a:tcPr marL="9525" marR="9525" marT="9525" marB="0" anchor="b"/>
+                </a:tc>
+                <a:tc>
+                  <a:txBody>
+                    <a:bodyPr/>
+                    <a:lstStyle/>
+                    <a:p>
+                      <a:pPr algn="l" fontAlgn="b"/>
+                      <a:r>
+                        <a:rPr lang="en-US" sz="2000" u="none" strike="noStrike">
+                          <a:effectLst/>
+                        </a:rPr>
+                        <a:t>0</a:t>
+                      </a:r>
+                      <a:endParaRPr lang="en-US" sz="2000" b="0" i="0" u="none" strike="noStrike">
+                        <a:solidFill>
+                          <a:srgbClr val="000000"/>
+                        </a:solidFill>
+                        <a:effectLst/>
+                        <a:latin typeface="Calibri"/>
+                      </a:endParaRPr>
+                    </a:p>
+                  </a:txBody>
+                  <a:tcPr marL="9525" marR="9525" marT="9525" marB="0" anchor="b"/>
+                </a:tc>
+                <a:tc>
+                  <a:txBody>
+                    <a:bodyPr/>
+                    <a:lstStyle/>
+                    <a:p>
+                      <a:pPr algn="l" fontAlgn="b"/>
+                      <a:r>
+                        <a:rPr lang="en-US" sz="2000" u="none" strike="noStrike">
+                          <a:effectLst/>
+                        </a:rPr>
                         <a:t>2</a:t>
                       </a:r>
                       <a:endParaRPr lang="en-US" sz="2000" b="0" i="0" u="none" strike="noStrike">
@@ -7373,29 +7292,6 @@
                         <a:rPr lang="en-US" sz="2000" u="none" strike="noStrike">
                           <a:effectLst/>
                         </a:rPr>
-                        <a:t>1</a:t>
-                      </a:r>
-                      <a:endParaRPr lang="en-US" sz="2000" b="0" i="0" u="none" strike="noStrike">
-                        <a:solidFill>
-                          <a:srgbClr val="000000"/>
-                        </a:solidFill>
-                        <a:effectLst/>
-                        <a:latin typeface="Calibri"/>
-                      </a:endParaRPr>
-                    </a:p>
-                  </a:txBody>
-                  <a:tcPr marL="9525" marR="9525" marT="9525" marB="0" anchor="b"/>
-                </a:tc>
-                <a:tc>
-                  <a:txBody>
-                    <a:bodyPr/>
-                    <a:lstStyle/>
-                    <a:p>
-                      <a:pPr algn="l" fontAlgn="b"/>
-                      <a:r>
-                        <a:rPr lang="en-US" sz="2000" u="none" strike="noStrike">
-                          <a:effectLst/>
-                        </a:rPr>
                         <a:t>2</a:t>
                       </a:r>
                       <a:endParaRPr lang="en-US" sz="2000" b="0" i="0" u="none" strike="noStrike">
@@ -7419,52 +7315,6 @@
                         <a:rPr lang="en-US" sz="2000" u="none" strike="noStrike">
                           <a:effectLst/>
                         </a:rPr>
-                        <a:t>2</a:t>
-                      </a:r>
-                      <a:endParaRPr lang="en-US" sz="2000" b="0" i="0" u="none" strike="noStrike">
-                        <a:solidFill>
-                          <a:srgbClr val="000000"/>
-                        </a:solidFill>
-                        <a:effectLst/>
-                        <a:latin typeface="Calibri"/>
-                      </a:endParaRPr>
-                    </a:p>
-                  </a:txBody>
-                  <a:tcPr marL="9525" marR="9525" marT="9525" marB="0" anchor="b"/>
-                </a:tc>
-                <a:tc>
-                  <a:txBody>
-                    <a:bodyPr/>
-                    <a:lstStyle/>
-                    <a:p>
-                      <a:pPr algn="l" fontAlgn="b"/>
-                      <a:r>
-                        <a:rPr lang="en-US" sz="2000" u="none" strike="noStrike">
-                          <a:effectLst/>
-                        </a:rPr>
-                        <a:t>1</a:t>
-                      </a:r>
-                      <a:endParaRPr lang="en-US" sz="2000" b="0" i="0" u="none" strike="noStrike">
-                        <a:solidFill>
-                          <a:srgbClr val="000000"/>
-                        </a:solidFill>
-                        <a:effectLst/>
-                        <a:latin typeface="Calibri"/>
-                      </a:endParaRPr>
-                    </a:p>
-                  </a:txBody>
-                  <a:tcPr marL="9525" marR="9525" marT="9525" marB="0" anchor="b"/>
-                </a:tc>
-                <a:tc>
-                  <a:txBody>
-                    <a:bodyPr/>
-                    <a:lstStyle/>
-                    <a:p>
-                      <a:pPr algn="l" fontAlgn="b"/>
-                      <a:r>
-                        <a:rPr lang="en-US" sz="2000" u="none" strike="noStrike">
-                          <a:effectLst/>
-                        </a:rPr>
                         <a:t>0</a:t>
                       </a:r>
                       <a:endParaRPr lang="en-US" sz="2000" b="0" i="0" u="none" strike="noStrike">
@@ -7488,7 +7338,30 @@
                         <a:rPr lang="en-US" sz="2000" u="none" strike="noStrike">
                           <a:effectLst/>
                         </a:rPr>
-                        <a:t>1</a:t>
+                        <a:t>0</a:t>
+                      </a:r>
+                      <a:endParaRPr lang="en-US" sz="2000" b="0" i="0" u="none" strike="noStrike">
+                        <a:solidFill>
+                          <a:srgbClr val="000000"/>
+                        </a:solidFill>
+                        <a:effectLst/>
+                        <a:latin typeface="Calibri"/>
+                      </a:endParaRPr>
+                    </a:p>
+                  </a:txBody>
+                  <a:tcPr marL="9525" marR="9525" marT="9525" marB="0" anchor="b"/>
+                </a:tc>
+                <a:tc>
+                  <a:txBody>
+                    <a:bodyPr/>
+                    <a:lstStyle/>
+                    <a:p>
+                      <a:pPr algn="l" fontAlgn="b"/>
+                      <a:r>
+                        <a:rPr lang="en-US" sz="2000" u="none" strike="noStrike">
+                          <a:effectLst/>
+                        </a:rPr>
+                        <a:t>4</a:t>
                       </a:r>
                       <a:endParaRPr lang="en-US" sz="2000" b="0" i="0" u="none" strike="noStrike">
                         <a:solidFill>
@@ -7513,6 +7386,75 @@
                         <a:rPr lang="en-US" sz="2000" u="none" strike="noStrike">
                           <a:effectLst/>
                         </a:rPr>
+                        <a:t>0</a:t>
+                      </a:r>
+                      <a:endParaRPr lang="en-US" sz="2000" b="0" i="0" u="none" strike="noStrike">
+                        <a:solidFill>
+                          <a:srgbClr val="000000"/>
+                        </a:solidFill>
+                        <a:effectLst/>
+                        <a:latin typeface="Calibri"/>
+                      </a:endParaRPr>
+                    </a:p>
+                  </a:txBody>
+                  <a:tcPr marL="9525" marR="9525" marT="9525" marB="0" anchor="b"/>
+                </a:tc>
+                <a:tc>
+                  <a:txBody>
+                    <a:bodyPr/>
+                    <a:lstStyle/>
+                    <a:p>
+                      <a:pPr algn="l" fontAlgn="b"/>
+                      <a:r>
+                        <a:rPr lang="en-US" sz="2000" u="none" strike="noStrike">
+                          <a:effectLst/>
+                        </a:rPr>
+                        <a:t>0</a:t>
+                      </a:r>
+                      <a:endParaRPr lang="en-US" sz="2000" b="0" i="0" u="none" strike="noStrike">
+                        <a:solidFill>
+                          <a:srgbClr val="000000"/>
+                        </a:solidFill>
+                        <a:effectLst/>
+                        <a:latin typeface="Calibri"/>
+                      </a:endParaRPr>
+                    </a:p>
+                  </a:txBody>
+                  <a:tcPr marL="9525" marR="9525" marT="9525" marB="0" anchor="b"/>
+                </a:tc>
+                <a:tc>
+                  <a:txBody>
+                    <a:bodyPr/>
+                    <a:lstStyle/>
+                    <a:p>
+                      <a:pPr algn="l" fontAlgn="b"/>
+                      <a:r>
+                        <a:rPr lang="en-US" sz="2000" u="none" strike="noStrike">
+                          <a:effectLst/>
+                        </a:rPr>
+                        <a:t>3</a:t>
+                      </a:r>
+                      <a:endParaRPr lang="en-US" sz="2000" b="0" i="0" u="none" strike="noStrike">
+                        <a:solidFill>
+                          <a:srgbClr val="000000"/>
+                        </a:solidFill>
+                        <a:effectLst/>
+                        <a:latin typeface="Calibri"/>
+                      </a:endParaRPr>
+                    </a:p>
+                  </a:txBody>
+                  <a:tcPr marL="9525" marR="9525" marT="9525" marB="0" anchor="b"/>
+                </a:tc>
+                <a:tc>
+                  <a:txBody>
+                    <a:bodyPr/>
+                    <a:lstStyle/>
+                    <a:p>
+                      <a:pPr algn="l" fontAlgn="b"/>
+                      <a:r>
+                        <a:rPr lang="en-US" sz="2000" u="none" strike="noStrike">
+                          <a:effectLst/>
+                        </a:rPr>
                         <a:t>1</a:t>
                       </a:r>
                       <a:endParaRPr lang="en-US" sz="2000" b="0" i="0" u="none" strike="noStrike">
@@ -7559,52 +7501,6 @@
                         <a:rPr lang="en-US" sz="2000" u="none" strike="noStrike">
                           <a:effectLst/>
                         </a:rPr>
-                        <a:t>1</a:t>
-                      </a:r>
-                      <a:endParaRPr lang="en-US" sz="2000" b="0" i="0" u="none" strike="noStrike">
-                        <a:solidFill>
-                          <a:srgbClr val="000000"/>
-                        </a:solidFill>
-                        <a:effectLst/>
-                        <a:latin typeface="Calibri"/>
-                      </a:endParaRPr>
-                    </a:p>
-                  </a:txBody>
-                  <a:tcPr marL="9525" marR="9525" marT="9525" marB="0" anchor="b"/>
-                </a:tc>
-                <a:tc>
-                  <a:txBody>
-                    <a:bodyPr/>
-                    <a:lstStyle/>
-                    <a:p>
-                      <a:pPr algn="l" fontAlgn="b"/>
-                      <a:r>
-                        <a:rPr lang="en-US" sz="2000" u="none" strike="noStrike">
-                          <a:effectLst/>
-                        </a:rPr>
-                        <a:t>1</a:t>
-                      </a:r>
-                      <a:endParaRPr lang="en-US" sz="2000" b="0" i="0" u="none" strike="noStrike">
-                        <a:solidFill>
-                          <a:srgbClr val="000000"/>
-                        </a:solidFill>
-                        <a:effectLst/>
-                        <a:latin typeface="Calibri"/>
-                      </a:endParaRPr>
-                    </a:p>
-                  </a:txBody>
-                  <a:tcPr marL="9525" marR="9525" marT="9525" marB="0" anchor="b"/>
-                </a:tc>
-                <a:tc>
-                  <a:txBody>
-                    <a:bodyPr/>
-                    <a:lstStyle/>
-                    <a:p>
-                      <a:pPr algn="l" fontAlgn="b"/>
-                      <a:r>
-                        <a:rPr lang="en-US" sz="2000" u="none" strike="noStrike">
-                          <a:effectLst/>
-                        </a:rPr>
                         <a:t>0</a:t>
                       </a:r>
                       <a:endParaRPr lang="en-US" sz="2000" b="0" i="0" u="none" strike="noStrike">
@@ -7625,848 +7521,10 @@
                     <a:p>
                       <a:pPr algn="l" fontAlgn="b"/>
                       <a:r>
-                        <a:rPr lang="en-US" sz="2000" u="none" strike="noStrike">
-                          <a:effectLst/>
-                        </a:rPr>
-                        <a:t>0</a:t>
-                      </a:r>
-                      <a:endParaRPr lang="en-US" sz="2000" b="0" i="0" u="none" strike="noStrike">
-                        <a:solidFill>
-                          <a:srgbClr val="000000"/>
-                        </a:solidFill>
-                        <a:effectLst/>
-                        <a:latin typeface="Calibri"/>
-                      </a:endParaRPr>
-                    </a:p>
-                  </a:txBody>
-                  <a:tcPr marL="9525" marR="9525" marT="9525" marB="0" anchor="b"/>
-                </a:tc>
-                <a:tc>
-                  <a:txBody>
-                    <a:bodyPr/>
-                    <a:lstStyle/>
-                    <a:p>
-                      <a:pPr algn="l" fontAlgn="b"/>
-                      <a:r>
-                        <a:rPr lang="en-US" sz="2000" u="none" strike="noStrike">
-                          <a:effectLst/>
-                        </a:rPr>
-                        <a:t>4</a:t>
-                      </a:r>
-                      <a:endParaRPr lang="en-US" sz="2000" b="0" i="0" u="none" strike="noStrike">
-                        <a:solidFill>
-                          <a:srgbClr val="000000"/>
-                        </a:solidFill>
-                        <a:effectLst/>
-                        <a:latin typeface="Calibri"/>
-                      </a:endParaRPr>
-                    </a:p>
-                  </a:txBody>
-                  <a:tcPr marL="9525" marR="9525" marT="9525" marB="0" anchor="b"/>
-                </a:tc>
-              </a:tr>
-              <a:tr h="333375">
-                <a:tc>
-                  <a:txBody>
-                    <a:bodyPr/>
-                    <a:lstStyle/>
-                    <a:p>
-                      <a:pPr algn="l" fontAlgn="b"/>
-                      <a:r>
-                        <a:rPr lang="en-US" sz="2000" u="none" strike="noStrike">
-                          <a:effectLst/>
-                        </a:rPr>
-                        <a:t>0</a:t>
-                      </a:r>
-                      <a:endParaRPr lang="en-US" sz="2000" b="0" i="0" u="none" strike="noStrike">
-                        <a:solidFill>
-                          <a:srgbClr val="000000"/>
-                        </a:solidFill>
-                        <a:effectLst/>
-                        <a:latin typeface="Calibri"/>
-                      </a:endParaRPr>
-                    </a:p>
-                  </a:txBody>
-                  <a:tcPr marL="9525" marR="9525" marT="9525" marB="0" anchor="b"/>
-                </a:tc>
-                <a:tc>
-                  <a:txBody>
-                    <a:bodyPr/>
-                    <a:lstStyle/>
-                    <a:p>
-                      <a:pPr algn="l" fontAlgn="b"/>
-                      <a:r>
-                        <a:rPr lang="en-US" sz="2000" u="none" strike="noStrike">
-                          <a:effectLst/>
-                        </a:rPr>
-                        <a:t>0</a:t>
-                      </a:r>
-                      <a:endParaRPr lang="en-US" sz="2000" b="0" i="0" u="none" strike="noStrike">
-                        <a:solidFill>
-                          <a:srgbClr val="000000"/>
-                        </a:solidFill>
-                        <a:effectLst/>
-                        <a:latin typeface="Calibri"/>
-                      </a:endParaRPr>
-                    </a:p>
-                  </a:txBody>
-                  <a:tcPr marL="9525" marR="9525" marT="9525" marB="0" anchor="b"/>
-                </a:tc>
-                <a:tc>
-                  <a:txBody>
-                    <a:bodyPr/>
-                    <a:lstStyle/>
-                    <a:p>
-                      <a:pPr algn="l" fontAlgn="b"/>
-                      <a:r>
-                        <a:rPr lang="en-US" sz="2000" u="none" strike="noStrike">
+                        <a:rPr lang="en-US" sz="2000" u="none" strike="noStrike" dirty="0">
                           <a:effectLst/>
                         </a:rPr>
                         <a:t>2</a:t>
-                      </a:r>
-                      <a:endParaRPr lang="en-US" sz="2000" b="0" i="0" u="none" strike="noStrike">
-                        <a:solidFill>
-                          <a:srgbClr val="000000"/>
-                        </a:solidFill>
-                        <a:effectLst/>
-                        <a:latin typeface="Calibri"/>
-                      </a:endParaRPr>
-                    </a:p>
-                  </a:txBody>
-                  <a:tcPr marL="9525" marR="9525" marT="9525" marB="0" anchor="b"/>
-                </a:tc>
-                <a:tc>
-                  <a:txBody>
-                    <a:bodyPr/>
-                    <a:lstStyle/>
-                    <a:p>
-                      <a:pPr algn="l" fontAlgn="b"/>
-                      <a:r>
-                        <a:rPr lang="en-US" sz="2000" u="none" strike="noStrike">
-                          <a:effectLst/>
-                        </a:rPr>
-                        <a:t>2</a:t>
-                      </a:r>
-                      <a:endParaRPr lang="en-US" sz="2000" b="0" i="0" u="none" strike="noStrike">
-                        <a:solidFill>
-                          <a:srgbClr val="000000"/>
-                        </a:solidFill>
-                        <a:effectLst/>
-                        <a:latin typeface="Calibri"/>
-                      </a:endParaRPr>
-                    </a:p>
-                  </a:txBody>
-                  <a:tcPr marL="9525" marR="9525" marT="9525" marB="0" anchor="b"/>
-                </a:tc>
-                <a:tc>
-                  <a:txBody>
-                    <a:bodyPr/>
-                    <a:lstStyle/>
-                    <a:p>
-                      <a:pPr algn="l" fontAlgn="b"/>
-                      <a:r>
-                        <a:rPr lang="en-US" sz="2000" u="none" strike="noStrike">
-                          <a:effectLst/>
-                        </a:rPr>
-                        <a:t>0</a:t>
-                      </a:r>
-                      <a:endParaRPr lang="en-US" sz="2000" b="0" i="0" u="none" strike="noStrike">
-                        <a:solidFill>
-                          <a:srgbClr val="000000"/>
-                        </a:solidFill>
-                        <a:effectLst/>
-                        <a:latin typeface="Calibri"/>
-                      </a:endParaRPr>
-                    </a:p>
-                  </a:txBody>
-                  <a:tcPr marL="9525" marR="9525" marT="9525" marB="0" anchor="b"/>
-                </a:tc>
-                <a:tc>
-                  <a:txBody>
-                    <a:bodyPr/>
-                    <a:lstStyle/>
-                    <a:p>
-                      <a:pPr algn="l" fontAlgn="b"/>
-                      <a:r>
-                        <a:rPr lang="en-US" sz="2000" u="none" strike="noStrike">
-                          <a:effectLst/>
-                        </a:rPr>
-                        <a:t>0</a:t>
-                      </a:r>
-                      <a:endParaRPr lang="en-US" sz="2000" b="0" i="0" u="none" strike="noStrike">
-                        <a:solidFill>
-                          <a:srgbClr val="000000"/>
-                        </a:solidFill>
-                        <a:effectLst/>
-                        <a:latin typeface="Calibri"/>
-                      </a:endParaRPr>
-                    </a:p>
-                  </a:txBody>
-                  <a:tcPr marL="9525" marR="9525" marT="9525" marB="0" anchor="b"/>
-                </a:tc>
-                <a:tc>
-                  <a:txBody>
-                    <a:bodyPr/>
-                    <a:lstStyle/>
-                    <a:p>
-                      <a:pPr algn="l" fontAlgn="b"/>
-                      <a:r>
-                        <a:rPr lang="en-US" sz="2000" u="none" strike="noStrike">
-                          <a:effectLst/>
-                        </a:rPr>
-                        <a:t>4</a:t>
-                      </a:r>
-                      <a:endParaRPr lang="en-US" sz="2000" b="0" i="0" u="none" strike="noStrike">
-                        <a:solidFill>
-                          <a:srgbClr val="000000"/>
-                        </a:solidFill>
-                        <a:effectLst/>
-                        <a:latin typeface="Calibri"/>
-                      </a:endParaRPr>
-                    </a:p>
-                  </a:txBody>
-                  <a:tcPr marL="9525" marR="9525" marT="9525" marB="0" anchor="b"/>
-                </a:tc>
-              </a:tr>
-              <a:tr h="333375">
-                <a:tc>
-                  <a:txBody>
-                    <a:bodyPr/>
-                    <a:lstStyle/>
-                    <a:p>
-                      <a:pPr algn="l" fontAlgn="b"/>
-                      <a:r>
-                        <a:rPr lang="en-US" sz="2000" u="none" strike="noStrike">
-                          <a:effectLst/>
-                        </a:rPr>
-                        <a:t>0</a:t>
-                      </a:r>
-                      <a:endParaRPr lang="en-US" sz="2000" b="0" i="0" u="none" strike="noStrike">
-                        <a:solidFill>
-                          <a:srgbClr val="000000"/>
-                        </a:solidFill>
-                        <a:effectLst/>
-                        <a:latin typeface="Calibri"/>
-                      </a:endParaRPr>
-                    </a:p>
-                  </a:txBody>
-                  <a:tcPr marL="9525" marR="9525" marT="9525" marB="0" anchor="b"/>
-                </a:tc>
-                <a:tc>
-                  <a:txBody>
-                    <a:bodyPr/>
-                    <a:lstStyle/>
-                    <a:p>
-                      <a:pPr algn="l" fontAlgn="b"/>
-                      <a:r>
-                        <a:rPr lang="en-US" sz="2000" u="none" strike="noStrike">
-                          <a:effectLst/>
-                        </a:rPr>
-                        <a:t>0</a:t>
-                      </a:r>
-                      <a:endParaRPr lang="en-US" sz="2000" b="0" i="0" u="none" strike="noStrike">
-                        <a:solidFill>
-                          <a:srgbClr val="000000"/>
-                        </a:solidFill>
-                        <a:effectLst/>
-                        <a:latin typeface="Calibri"/>
-                      </a:endParaRPr>
-                    </a:p>
-                  </a:txBody>
-                  <a:tcPr marL="9525" marR="9525" marT="9525" marB="0" anchor="b"/>
-                </a:tc>
-                <a:tc>
-                  <a:txBody>
-                    <a:bodyPr/>
-                    <a:lstStyle/>
-                    <a:p>
-                      <a:pPr algn="l" fontAlgn="b"/>
-                      <a:r>
-                        <a:rPr lang="en-US" sz="2000" u="none" strike="noStrike">
-                          <a:effectLst/>
-                        </a:rPr>
-                        <a:t>3</a:t>
-                      </a:r>
-                      <a:endParaRPr lang="en-US" sz="2000" b="0" i="0" u="none" strike="noStrike">
-                        <a:solidFill>
-                          <a:srgbClr val="000000"/>
-                        </a:solidFill>
-                        <a:effectLst/>
-                        <a:latin typeface="Calibri"/>
-                      </a:endParaRPr>
-                    </a:p>
-                  </a:txBody>
-                  <a:tcPr marL="9525" marR="9525" marT="9525" marB="0" anchor="b"/>
-                </a:tc>
-                <a:tc>
-                  <a:txBody>
-                    <a:bodyPr/>
-                    <a:lstStyle/>
-                    <a:p>
-                      <a:pPr algn="l" fontAlgn="b"/>
-                      <a:r>
-                        <a:rPr lang="en-US" sz="2000" u="none" strike="noStrike">
-                          <a:effectLst/>
-                        </a:rPr>
-                        <a:t>1</a:t>
-                      </a:r>
-                      <a:endParaRPr lang="en-US" sz="2000" b="0" i="0" u="none" strike="noStrike">
-                        <a:solidFill>
-                          <a:srgbClr val="000000"/>
-                        </a:solidFill>
-                        <a:effectLst/>
-                        <a:latin typeface="Calibri"/>
-                      </a:endParaRPr>
-                    </a:p>
-                  </a:txBody>
-                  <a:tcPr marL="9525" marR="9525" marT="9525" marB="0" anchor="b"/>
-                </a:tc>
-                <a:tc>
-                  <a:txBody>
-                    <a:bodyPr/>
-                    <a:lstStyle/>
-                    <a:p>
-                      <a:pPr algn="l" fontAlgn="b"/>
-                      <a:r>
-                        <a:rPr lang="en-US" sz="2000" u="none" strike="noStrike">
-                          <a:effectLst/>
-                        </a:rPr>
-                        <a:t>0</a:t>
-                      </a:r>
-                      <a:endParaRPr lang="en-US" sz="2000" b="0" i="0" u="none" strike="noStrike">
-                        <a:solidFill>
-                          <a:srgbClr val="000000"/>
-                        </a:solidFill>
-                        <a:effectLst/>
-                        <a:latin typeface="Calibri"/>
-                      </a:endParaRPr>
-                    </a:p>
-                  </a:txBody>
-                  <a:tcPr marL="9525" marR="9525" marT="9525" marB="0" anchor="b"/>
-                </a:tc>
-                <a:tc>
-                  <a:txBody>
-                    <a:bodyPr/>
-                    <a:lstStyle/>
-                    <a:p>
-                      <a:pPr algn="l" fontAlgn="b"/>
-                      <a:r>
-                        <a:rPr lang="en-US" sz="2000" u="none" strike="noStrike">
-                          <a:effectLst/>
-                        </a:rPr>
-                        <a:t>0</a:t>
-                      </a:r>
-                      <a:endParaRPr lang="en-US" sz="2000" b="0" i="0" u="none" strike="noStrike">
-                        <a:solidFill>
-                          <a:srgbClr val="000000"/>
-                        </a:solidFill>
-                        <a:effectLst/>
-                        <a:latin typeface="Calibri"/>
-                      </a:endParaRPr>
-                    </a:p>
-                  </a:txBody>
-                  <a:tcPr marL="9525" marR="9525" marT="9525" marB="0" anchor="b"/>
-                </a:tc>
-                <a:tc>
-                  <a:txBody>
-                    <a:bodyPr/>
-                    <a:lstStyle/>
-                    <a:p>
-                      <a:pPr algn="l" fontAlgn="b"/>
-                      <a:r>
-                        <a:rPr lang="en-US" sz="2000" u="none" strike="noStrike">
-                          <a:effectLst/>
-                        </a:rPr>
-                        <a:t>2</a:t>
-                      </a:r>
-                      <a:endParaRPr lang="en-US" sz="2000" b="0" i="0" u="none" strike="noStrike">
-                        <a:solidFill>
-                          <a:srgbClr val="000000"/>
-                        </a:solidFill>
-                        <a:effectLst/>
-                        <a:latin typeface="Calibri"/>
-                      </a:endParaRPr>
-                    </a:p>
-                  </a:txBody>
-                  <a:tcPr marL="9525" marR="9525" marT="9525" marB="0" anchor="b"/>
-                </a:tc>
-              </a:tr>
-              <a:tr h="333375">
-                <a:tc>
-                  <a:txBody>
-                    <a:bodyPr/>
-                    <a:lstStyle/>
-                    <a:p>
-                      <a:pPr algn="l" fontAlgn="b"/>
-                      <a:r>
-                        <a:rPr lang="en-US" sz="2000" u="none" strike="noStrike">
-                          <a:effectLst/>
-                        </a:rPr>
-                        <a:t>2</a:t>
-                      </a:r>
-                      <a:endParaRPr lang="en-US" sz="2000" b="0" i="0" u="none" strike="noStrike">
-                        <a:solidFill>
-                          <a:srgbClr val="000000"/>
-                        </a:solidFill>
-                        <a:effectLst/>
-                        <a:latin typeface="Calibri"/>
-                      </a:endParaRPr>
-                    </a:p>
-                  </a:txBody>
-                  <a:tcPr marL="9525" marR="9525" marT="9525" marB="0" anchor="b"/>
-                </a:tc>
-                <a:tc>
-                  <a:txBody>
-                    <a:bodyPr/>
-                    <a:lstStyle/>
-                    <a:p>
-                      <a:pPr algn="l" fontAlgn="b"/>
-                      <a:r>
-                        <a:rPr lang="en-US" sz="2000" u="none" strike="noStrike">
-                          <a:effectLst/>
-                        </a:rPr>
-                        <a:t>0</a:t>
-                      </a:r>
-                      <a:endParaRPr lang="en-US" sz="2000" b="0" i="0" u="none" strike="noStrike">
-                        <a:solidFill>
-                          <a:srgbClr val="000000"/>
-                        </a:solidFill>
-                        <a:effectLst/>
-                        <a:latin typeface="Calibri"/>
-                      </a:endParaRPr>
-                    </a:p>
-                  </a:txBody>
-                  <a:tcPr marL="9525" marR="9525" marT="9525" marB="0" anchor="b"/>
-                </a:tc>
-                <a:tc>
-                  <a:txBody>
-                    <a:bodyPr/>
-                    <a:lstStyle/>
-                    <a:p>
-                      <a:pPr algn="l" fontAlgn="b"/>
-                      <a:r>
-                        <a:rPr lang="en-US" sz="2000" u="none" strike="noStrike">
-                          <a:effectLst/>
-                        </a:rPr>
-                        <a:t>4</a:t>
-                      </a:r>
-                      <a:endParaRPr lang="en-US" sz="2000" b="0" i="0" u="none" strike="noStrike">
-                        <a:solidFill>
-                          <a:srgbClr val="000000"/>
-                        </a:solidFill>
-                        <a:effectLst/>
-                        <a:latin typeface="Calibri"/>
-                      </a:endParaRPr>
-                    </a:p>
-                  </a:txBody>
-                  <a:tcPr marL="9525" marR="9525" marT="9525" marB="0" anchor="b"/>
-                </a:tc>
-                <a:tc>
-                  <a:txBody>
-                    <a:bodyPr/>
-                    <a:lstStyle/>
-                    <a:p>
-                      <a:pPr algn="l" fontAlgn="b"/>
-                      <a:r>
-                        <a:rPr lang="en-US" sz="2000" u="none" strike="noStrike">
-                          <a:effectLst/>
-                        </a:rPr>
-                        <a:t>3</a:t>
-                      </a:r>
-                      <a:endParaRPr lang="en-US" sz="2000" b="0" i="0" u="none" strike="noStrike">
-                        <a:solidFill>
-                          <a:srgbClr val="000000"/>
-                        </a:solidFill>
-                        <a:effectLst/>
-                        <a:latin typeface="Calibri"/>
-                      </a:endParaRPr>
-                    </a:p>
-                  </a:txBody>
-                  <a:tcPr marL="9525" marR="9525" marT="9525" marB="0" anchor="b"/>
-                </a:tc>
-                <a:tc>
-                  <a:txBody>
-                    <a:bodyPr/>
-                    <a:lstStyle/>
-                    <a:p>
-                      <a:pPr algn="l" fontAlgn="b"/>
-                      <a:r>
-                        <a:rPr lang="en-US" sz="2000" u="none" strike="noStrike">
-                          <a:effectLst/>
-                        </a:rPr>
-                        <a:t>0</a:t>
-                      </a:r>
-                      <a:endParaRPr lang="en-US" sz="2000" b="0" i="0" u="none" strike="noStrike">
-                        <a:solidFill>
-                          <a:srgbClr val="000000"/>
-                        </a:solidFill>
-                        <a:effectLst/>
-                        <a:latin typeface="Calibri"/>
-                      </a:endParaRPr>
-                    </a:p>
-                  </a:txBody>
-                  <a:tcPr marL="9525" marR="9525" marT="9525" marB="0" anchor="b"/>
-                </a:tc>
-                <a:tc>
-                  <a:txBody>
-                    <a:bodyPr/>
-                    <a:lstStyle/>
-                    <a:p>
-                      <a:pPr algn="l" fontAlgn="b"/>
-                      <a:r>
-                        <a:rPr lang="en-US" sz="2000" u="none" strike="noStrike">
-                          <a:effectLst/>
-                        </a:rPr>
-                        <a:t>0</a:t>
-                      </a:r>
-                      <a:endParaRPr lang="en-US" sz="2000" b="0" i="0" u="none" strike="noStrike">
-                        <a:solidFill>
-                          <a:srgbClr val="000000"/>
-                        </a:solidFill>
-                        <a:effectLst/>
-                        <a:latin typeface="Calibri"/>
-                      </a:endParaRPr>
-                    </a:p>
-                  </a:txBody>
-                  <a:tcPr marL="9525" marR="9525" marT="9525" marB="0" anchor="b"/>
-                </a:tc>
-                <a:tc>
-                  <a:txBody>
-                    <a:bodyPr/>
-                    <a:lstStyle/>
-                    <a:p>
-                      <a:pPr algn="l" fontAlgn="b"/>
-                      <a:r>
-                        <a:rPr lang="en-US" sz="2000" u="none" strike="noStrike">
-                          <a:effectLst/>
-                        </a:rPr>
-                        <a:t>4</a:t>
-                      </a:r>
-                      <a:endParaRPr lang="en-US" sz="2000" b="0" i="0" u="none" strike="noStrike">
-                        <a:solidFill>
-                          <a:srgbClr val="000000"/>
-                        </a:solidFill>
-                        <a:effectLst/>
-                        <a:latin typeface="Calibri"/>
-                      </a:endParaRPr>
-                    </a:p>
-                  </a:txBody>
-                  <a:tcPr marL="9525" marR="9525" marT="9525" marB="0" anchor="b"/>
-                </a:tc>
-              </a:tr>
-              <a:tr h="333375">
-                <a:tc>
-                  <a:txBody>
-                    <a:bodyPr/>
-                    <a:lstStyle/>
-                    <a:p>
-                      <a:pPr algn="l" fontAlgn="b"/>
-                      <a:r>
-                        <a:rPr lang="en-US" sz="2000" u="none" strike="noStrike">
-                          <a:effectLst/>
-                        </a:rPr>
-                        <a:t>1</a:t>
-                      </a:r>
-                      <a:endParaRPr lang="en-US" sz="2000" b="0" i="0" u="none" strike="noStrike">
-                        <a:solidFill>
-                          <a:srgbClr val="000000"/>
-                        </a:solidFill>
-                        <a:effectLst/>
-                        <a:latin typeface="Calibri"/>
-                      </a:endParaRPr>
-                    </a:p>
-                  </a:txBody>
-                  <a:tcPr marL="9525" marR="9525" marT="9525" marB="0" anchor="b"/>
-                </a:tc>
-                <a:tc>
-                  <a:txBody>
-                    <a:bodyPr/>
-                    <a:lstStyle/>
-                    <a:p>
-                      <a:pPr algn="l" fontAlgn="b"/>
-                      <a:r>
-                        <a:rPr lang="en-US" sz="2000" u="none" strike="noStrike">
-                          <a:effectLst/>
-                        </a:rPr>
-                        <a:t>1</a:t>
-                      </a:r>
-                      <a:endParaRPr lang="en-US" sz="2000" b="0" i="0" u="none" strike="noStrike">
-                        <a:solidFill>
-                          <a:srgbClr val="000000"/>
-                        </a:solidFill>
-                        <a:effectLst/>
-                        <a:latin typeface="Calibri"/>
-                      </a:endParaRPr>
-                    </a:p>
-                  </a:txBody>
-                  <a:tcPr marL="9525" marR="9525" marT="9525" marB="0" anchor="b"/>
-                </a:tc>
-                <a:tc>
-                  <a:txBody>
-                    <a:bodyPr/>
-                    <a:lstStyle/>
-                    <a:p>
-                      <a:pPr algn="l" fontAlgn="b"/>
-                      <a:r>
-                        <a:rPr lang="en-US" sz="2000" u="none" strike="noStrike">
-                          <a:effectLst/>
-                        </a:rPr>
-                        <a:t>3</a:t>
-                      </a:r>
-                      <a:endParaRPr lang="en-US" sz="2000" b="0" i="0" u="none" strike="noStrike">
-                        <a:solidFill>
-                          <a:srgbClr val="000000"/>
-                        </a:solidFill>
-                        <a:effectLst/>
-                        <a:latin typeface="Calibri"/>
-                      </a:endParaRPr>
-                    </a:p>
-                  </a:txBody>
-                  <a:tcPr marL="9525" marR="9525" marT="9525" marB="0" anchor="b"/>
-                </a:tc>
-                <a:tc>
-                  <a:txBody>
-                    <a:bodyPr/>
-                    <a:lstStyle/>
-                    <a:p>
-                      <a:pPr algn="l" fontAlgn="b"/>
-                      <a:r>
-                        <a:rPr lang="en-US" sz="2000" u="none" strike="noStrike">
-                          <a:effectLst/>
-                        </a:rPr>
-                        <a:t>1</a:t>
-                      </a:r>
-                      <a:endParaRPr lang="en-US" sz="2000" b="0" i="0" u="none" strike="noStrike">
-                        <a:solidFill>
-                          <a:srgbClr val="000000"/>
-                        </a:solidFill>
-                        <a:effectLst/>
-                        <a:latin typeface="Calibri"/>
-                      </a:endParaRPr>
-                    </a:p>
-                  </a:txBody>
-                  <a:tcPr marL="9525" marR="9525" marT="9525" marB="0" anchor="b"/>
-                </a:tc>
-                <a:tc>
-                  <a:txBody>
-                    <a:bodyPr/>
-                    <a:lstStyle/>
-                    <a:p>
-                      <a:pPr algn="l" fontAlgn="b"/>
-                      <a:r>
-                        <a:rPr lang="en-US" sz="2000" u="none" strike="noStrike">
-                          <a:effectLst/>
-                        </a:rPr>
-                        <a:t>1</a:t>
-                      </a:r>
-                      <a:endParaRPr lang="en-US" sz="2000" b="0" i="0" u="none" strike="noStrike">
-                        <a:solidFill>
-                          <a:srgbClr val="000000"/>
-                        </a:solidFill>
-                        <a:effectLst/>
-                        <a:latin typeface="Calibri"/>
-                      </a:endParaRPr>
-                    </a:p>
-                  </a:txBody>
-                  <a:tcPr marL="9525" marR="9525" marT="9525" marB="0" anchor="b"/>
-                </a:tc>
-                <a:tc>
-                  <a:txBody>
-                    <a:bodyPr/>
-                    <a:lstStyle/>
-                    <a:p>
-                      <a:pPr algn="l" fontAlgn="b"/>
-                      <a:r>
-                        <a:rPr lang="en-US" sz="2000" u="none" strike="noStrike">
-                          <a:effectLst/>
-                        </a:rPr>
-                        <a:t>2</a:t>
-                      </a:r>
-                      <a:endParaRPr lang="en-US" sz="2000" b="0" i="0" u="none" strike="noStrike">
-                        <a:solidFill>
-                          <a:srgbClr val="000000"/>
-                        </a:solidFill>
-                        <a:effectLst/>
-                        <a:latin typeface="Calibri"/>
-                      </a:endParaRPr>
-                    </a:p>
-                  </a:txBody>
-                  <a:tcPr marL="9525" marR="9525" marT="9525" marB="0" anchor="b"/>
-                </a:tc>
-                <a:tc>
-                  <a:txBody>
-                    <a:bodyPr/>
-                    <a:lstStyle/>
-                    <a:p>
-                      <a:pPr algn="l" fontAlgn="b"/>
-                      <a:r>
-                        <a:rPr lang="en-US" sz="2000" u="none" strike="noStrike">
-                          <a:effectLst/>
-                        </a:rPr>
-                        <a:t>1</a:t>
-                      </a:r>
-                      <a:endParaRPr lang="en-US" sz="2000" b="0" i="0" u="none" strike="noStrike">
-                        <a:solidFill>
-                          <a:srgbClr val="000000"/>
-                        </a:solidFill>
-                        <a:effectLst/>
-                        <a:latin typeface="Calibri"/>
-                      </a:endParaRPr>
-                    </a:p>
-                  </a:txBody>
-                  <a:tcPr marL="9525" marR="9525" marT="9525" marB="0" anchor="b"/>
-                </a:tc>
-              </a:tr>
-              <a:tr h="333375">
-                <a:tc>
-                  <a:txBody>
-                    <a:bodyPr/>
-                    <a:lstStyle/>
-                    <a:p>
-                      <a:pPr algn="l" fontAlgn="b"/>
-                      <a:r>
-                        <a:rPr lang="en-US" sz="2000" u="none" strike="noStrike">
-                          <a:effectLst/>
-                        </a:rPr>
-                        <a:t>0</a:t>
-                      </a:r>
-                      <a:endParaRPr lang="en-US" sz="2000" b="0" i="0" u="none" strike="noStrike">
-                        <a:solidFill>
-                          <a:srgbClr val="000000"/>
-                        </a:solidFill>
-                        <a:effectLst/>
-                        <a:latin typeface="Calibri"/>
-                      </a:endParaRPr>
-                    </a:p>
-                  </a:txBody>
-                  <a:tcPr marL="9525" marR="9525" marT="9525" marB="0" anchor="b"/>
-                </a:tc>
-                <a:tc>
-                  <a:txBody>
-                    <a:bodyPr/>
-                    <a:lstStyle/>
-                    <a:p>
-                      <a:pPr algn="l" fontAlgn="b"/>
-                      <a:r>
-                        <a:rPr lang="en-US" sz="2000" u="none" strike="noStrike">
-                          <a:effectLst/>
-                        </a:rPr>
-                        <a:t>0</a:t>
-                      </a:r>
-                      <a:endParaRPr lang="en-US" sz="2000" b="0" i="0" u="none" strike="noStrike">
-                        <a:solidFill>
-                          <a:srgbClr val="000000"/>
-                        </a:solidFill>
-                        <a:effectLst/>
-                        <a:latin typeface="Calibri"/>
-                      </a:endParaRPr>
-                    </a:p>
-                  </a:txBody>
-                  <a:tcPr marL="9525" marR="9525" marT="9525" marB="0" anchor="b"/>
-                </a:tc>
-                <a:tc>
-                  <a:txBody>
-                    <a:bodyPr/>
-                    <a:lstStyle/>
-                    <a:p>
-                      <a:pPr algn="l" fontAlgn="b"/>
-                      <a:r>
-                        <a:rPr lang="en-US" sz="2000" u="none" strike="noStrike">
-                          <a:effectLst/>
-                        </a:rPr>
-                        <a:t>3</a:t>
-                      </a:r>
-                      <a:endParaRPr lang="en-US" sz="2000" b="0" i="0" u="none" strike="noStrike">
-                        <a:solidFill>
-                          <a:srgbClr val="000000"/>
-                        </a:solidFill>
-                        <a:effectLst/>
-                        <a:latin typeface="Calibri"/>
-                      </a:endParaRPr>
-                    </a:p>
-                  </a:txBody>
-                  <a:tcPr marL="9525" marR="9525" marT="9525" marB="0" anchor="b"/>
-                </a:tc>
-                <a:tc>
-                  <a:txBody>
-                    <a:bodyPr/>
-                    <a:lstStyle/>
-                    <a:p>
-                      <a:pPr algn="l" fontAlgn="b"/>
-                      <a:r>
-                        <a:rPr lang="en-US" sz="2000" u="none" strike="noStrike">
-                          <a:effectLst/>
-                        </a:rPr>
-                        <a:t>1</a:t>
-                      </a:r>
-                      <a:endParaRPr lang="en-US" sz="2000" b="0" i="0" u="none" strike="noStrike">
-                        <a:solidFill>
-                          <a:srgbClr val="000000"/>
-                        </a:solidFill>
-                        <a:effectLst/>
-                        <a:latin typeface="Calibri"/>
-                      </a:endParaRPr>
-                    </a:p>
-                  </a:txBody>
-                  <a:tcPr marL="9525" marR="9525" marT="9525" marB="0" anchor="b"/>
-                </a:tc>
-                <a:tc>
-                  <a:txBody>
-                    <a:bodyPr/>
-                    <a:lstStyle/>
-                    <a:p>
-                      <a:pPr algn="l" fontAlgn="b"/>
-                      <a:r>
-                        <a:rPr lang="en-US" sz="2000" u="none" strike="noStrike">
-                          <a:effectLst/>
-                        </a:rPr>
-                        <a:t>0</a:t>
-                      </a:r>
-                      <a:endParaRPr lang="en-US" sz="2000" b="0" i="0" u="none" strike="noStrike">
-                        <a:solidFill>
-                          <a:srgbClr val="000000"/>
-                        </a:solidFill>
-                        <a:effectLst/>
-                        <a:latin typeface="Calibri"/>
-                      </a:endParaRPr>
-                    </a:p>
-                  </a:txBody>
-                  <a:tcPr marL="9525" marR="9525" marT="9525" marB="0" anchor="b"/>
-                </a:tc>
-                <a:tc>
-                  <a:txBody>
-                    <a:bodyPr/>
-                    <a:lstStyle/>
-                    <a:p>
-                      <a:pPr algn="l" fontAlgn="b"/>
-                      <a:r>
-                        <a:rPr lang="en-US" sz="2000" u="none" strike="noStrike">
-                          <a:effectLst/>
-                        </a:rPr>
-                        <a:t>0</a:t>
-                      </a:r>
-                      <a:endParaRPr lang="en-US" sz="2000" b="0" i="0" u="none" strike="noStrike">
-                        <a:solidFill>
-                          <a:srgbClr val="000000"/>
-                        </a:solidFill>
-                        <a:effectLst/>
-                        <a:latin typeface="Calibri"/>
-                      </a:endParaRPr>
-                    </a:p>
-                  </a:txBody>
-                  <a:tcPr marL="9525" marR="9525" marT="9525" marB="0" anchor="b"/>
-                </a:tc>
-                <a:tc>
-                  <a:txBody>
-                    <a:bodyPr/>
-                    <a:lstStyle/>
-                    <a:p>
-                      <a:pPr algn="l" fontAlgn="b"/>
-                      <a:r>
-                        <a:rPr lang="en-US" sz="2000" u="none" strike="noStrike" dirty="0">
-                          <a:effectLst/>
-                        </a:rPr>
-                        <a:t>3</a:t>
                       </a:r>
                       <a:endParaRPr lang="en-US" sz="2000" b="0" i="0" u="none" strike="noStrike" dirty="0">
                         <a:solidFill>
@@ -8486,21 +7544,21 @@
       </p:graphicFrame>
       <p:graphicFrame>
         <p:nvGraphicFramePr>
-          <p:cNvPr id="5" name="Table 4"/>
+          <p:cNvPr id="7" name="Table 6"/>
           <p:cNvGraphicFramePr>
             <a:graphicFrameLocks noGrp="1"/>
           </p:cNvGraphicFramePr>
           <p:nvPr>
             <p:extLst>
               <p:ext uri="{D42A27DB-BD31-4B8C-83A1-F6EECF244321}">
-                <p14:modId xmlns:p14="http://schemas.microsoft.com/office/powerpoint/2010/main" val="1452895958"/>
+                <p14:modId xmlns:p14="http://schemas.microsoft.com/office/powerpoint/2010/main" val="2227304407"/>
               </p:ext>
             </p:extLst>
           </p:nvPr>
         </p:nvGraphicFramePr>
         <p:xfrm>
-          <a:off x="4343400" y="2590800"/>
-          <a:ext cx="2133600" cy="3667125"/>
+          <a:off x="4267200" y="2743200"/>
+          <a:ext cx="2133600" cy="2000250"/>
         </p:xfrm>
         <a:graphic>
           <a:graphicData uri="http://schemas.openxmlformats.org/drawingml/2006/table">
@@ -8525,35 +7583,35 @@
                     <a:p>
                       <a:pPr algn="l" fontAlgn="b"/>
                       <a:r>
-                        <a:rPr lang="en-US" sz="2000" u="none" strike="noStrike" dirty="0">
+                        <a:rPr lang="en-US" sz="2000" u="none" strike="noStrike">
                           <a:effectLst/>
                         </a:rPr>
                         <a:t>A</a:t>
                       </a:r>
-                      <a:endParaRPr lang="en-US" sz="2000" b="0" i="0" u="none" strike="noStrike" dirty="0">
-                        <a:solidFill>
-                          <a:srgbClr val="000000"/>
-                        </a:solidFill>
-                        <a:effectLst/>
-                        <a:latin typeface="Calibri"/>
-                      </a:endParaRPr>
-                    </a:p>
-                  </a:txBody>
-                  <a:tcPr marL="9525" marR="9525" marT="9525" marB="0" anchor="b"/>
-                </a:tc>
-                <a:tc>
-                  <a:txBody>
-                    <a:bodyPr/>
-                    <a:lstStyle/>
-                    <a:p>
-                      <a:pPr algn="l" fontAlgn="b"/>
-                      <a:r>
-                        <a:rPr lang="en-US" sz="2000" u="none" strike="noStrike" dirty="0">
+                      <a:endParaRPr lang="en-US" sz="2000" b="0" i="0" u="none" strike="noStrike">
+                        <a:solidFill>
+                          <a:srgbClr val="000000"/>
+                        </a:solidFill>
+                        <a:effectLst/>
+                        <a:latin typeface="Calibri"/>
+                      </a:endParaRPr>
+                    </a:p>
+                  </a:txBody>
+                  <a:tcPr marL="9525" marR="9525" marT="9525" marB="0" anchor="b"/>
+                </a:tc>
+                <a:tc>
+                  <a:txBody>
+                    <a:bodyPr/>
+                    <a:lstStyle/>
+                    <a:p>
+                      <a:pPr algn="l" fontAlgn="b"/>
+                      <a:r>
+                        <a:rPr lang="en-US" sz="2000" u="none" strike="noStrike">
                           <a:effectLst/>
                         </a:rPr>
                         <a:t>B</a:t>
                       </a:r>
-                      <a:endParaRPr lang="en-US" sz="2000" b="0" i="0" u="none" strike="noStrike" dirty="0">
+                      <a:endParaRPr lang="en-US" sz="2000" b="0" i="0" u="none" strike="noStrike">
                         <a:solidFill>
                           <a:srgbClr val="000000"/>
                         </a:solidFill>
@@ -8829,7 +7887,7 @@
                         <a:rPr lang="en-US" sz="2000" u="none" strike="noStrike">
                           <a:effectLst/>
                         </a:rPr>
-                        <a:t>3</a:t>
+                        <a:t>2</a:t>
                       </a:r>
                       <a:endParaRPr lang="en-US" sz="2000" b="0" i="0" u="none" strike="noStrike">
                         <a:solidFill>
@@ -8854,52 +7912,6 @@
                         <a:rPr lang="en-US" sz="2000" u="none" strike="noStrike">
                           <a:effectLst/>
                         </a:rPr>
-                        <a:t>0</a:t>
-                      </a:r>
-                      <a:endParaRPr lang="en-US" sz="2000" b="0" i="0" u="none" strike="noStrike">
-                        <a:solidFill>
-                          <a:srgbClr val="000000"/>
-                        </a:solidFill>
-                        <a:effectLst/>
-                        <a:latin typeface="Calibri"/>
-                      </a:endParaRPr>
-                    </a:p>
-                  </a:txBody>
-                  <a:tcPr marL="9525" marR="9525" marT="9525" marB="0" anchor="b"/>
-                </a:tc>
-                <a:tc>
-                  <a:txBody>
-                    <a:bodyPr/>
-                    <a:lstStyle/>
-                    <a:p>
-                      <a:pPr algn="l" fontAlgn="b"/>
-                      <a:r>
-                        <a:rPr lang="en-US" sz="2000" u="none" strike="noStrike">
-                          <a:effectLst/>
-                        </a:rPr>
-                        <a:t>0</a:t>
-                      </a:r>
-                      <a:endParaRPr lang="en-US" sz="2000" b="0" i="0" u="none" strike="noStrike">
-                        <a:solidFill>
-                          <a:srgbClr val="000000"/>
-                        </a:solidFill>
-                        <a:effectLst/>
-                        <a:latin typeface="Calibri"/>
-                      </a:endParaRPr>
-                    </a:p>
-                  </a:txBody>
-                  <a:tcPr marL="9525" marR="9525" marT="9525" marB="0" anchor="b"/>
-                </a:tc>
-                <a:tc>
-                  <a:txBody>
-                    <a:bodyPr/>
-                    <a:lstStyle/>
-                    <a:p>
-                      <a:pPr algn="l" fontAlgn="b"/>
-                      <a:r>
-                        <a:rPr lang="en-US" sz="2000" u="none" strike="noStrike">
-                          <a:effectLst/>
-                        </a:rPr>
                         <a:t>1</a:t>
                       </a:r>
                       <a:endParaRPr lang="en-US" sz="2000" b="0" i="0" u="none" strike="noStrike">
@@ -8946,30 +7958,53 @@
                         <a:rPr lang="en-US" sz="2000" u="none" strike="noStrike">
                           <a:effectLst/>
                         </a:rPr>
-                        <a:t>0</a:t>
-                      </a:r>
-                      <a:endParaRPr lang="en-US" sz="2000" b="0" i="0" u="none" strike="noStrike">
-                        <a:solidFill>
-                          <a:srgbClr val="000000"/>
-                        </a:solidFill>
-                        <a:effectLst/>
-                        <a:latin typeface="Calibri"/>
-                      </a:endParaRPr>
-                    </a:p>
-                  </a:txBody>
-                  <a:tcPr marL="9525" marR="9525" marT="9525" marB="0" anchor="b"/>
-                </a:tc>
-                <a:tc>
-                  <a:txBody>
-                    <a:bodyPr/>
-                    <a:lstStyle/>
-                    <a:p>
-                      <a:pPr algn="l" fontAlgn="b"/>
-                      <a:r>
-                        <a:rPr lang="en-US" sz="2000" u="none" strike="noStrike">
-                          <a:effectLst/>
-                        </a:rPr>
-                        <a:t>0</a:t>
+                        <a:t>3</a:t>
+                      </a:r>
+                      <a:endParaRPr lang="en-US" sz="2000" b="0" i="0" u="none" strike="noStrike">
+                        <a:solidFill>
+                          <a:srgbClr val="000000"/>
+                        </a:solidFill>
+                        <a:effectLst/>
+                        <a:latin typeface="Calibri"/>
+                      </a:endParaRPr>
+                    </a:p>
+                  </a:txBody>
+                  <a:tcPr marL="9525" marR="9525" marT="9525" marB="0" anchor="b"/>
+                </a:tc>
+                <a:tc>
+                  <a:txBody>
+                    <a:bodyPr/>
+                    <a:lstStyle/>
+                    <a:p>
+                      <a:pPr algn="l" fontAlgn="b"/>
+                      <a:r>
+                        <a:rPr lang="en-US" sz="2000" u="none" strike="noStrike">
+                          <a:effectLst/>
+                        </a:rPr>
+                        <a:t>3</a:t>
+                      </a:r>
+                      <a:endParaRPr lang="en-US" sz="2000" b="0" i="0" u="none" strike="noStrike">
+                        <a:solidFill>
+                          <a:srgbClr val="000000"/>
+                        </a:solidFill>
+                        <a:effectLst/>
+                        <a:latin typeface="Calibri"/>
+                      </a:endParaRPr>
+                    </a:p>
+                  </a:txBody>
+                  <a:tcPr marL="9525" marR="9525" marT="9525" marB="0" anchor="b"/>
+                </a:tc>
+                <a:tc>
+                  <a:txBody>
+                    <a:bodyPr/>
+                    <a:lstStyle/>
+                    <a:p>
+                      <a:pPr algn="l" fontAlgn="b"/>
+                      <a:r>
+                        <a:rPr lang="en-US" sz="2000" u="none" strike="noStrike">
+                          <a:effectLst/>
+                        </a:rPr>
+                        <a:t>1</a:t>
                       </a:r>
                       <a:endParaRPr lang="en-US" sz="2000" b="0" i="0" u="none" strike="noStrike">
                         <a:solidFill>
@@ -8993,6 +8028,29 @@
                           <a:effectLst/>
                         </a:rPr>
                         <a:t>2</a:t>
+                      </a:r>
+                      <a:endParaRPr lang="en-US" sz="2000" b="0" i="0" u="none" strike="noStrike">
+                        <a:solidFill>
+                          <a:srgbClr val="000000"/>
+                        </a:solidFill>
+                        <a:effectLst/>
+                        <a:latin typeface="Calibri"/>
+                      </a:endParaRPr>
+                    </a:p>
+                  </a:txBody>
+                  <a:tcPr marL="9525" marR="9525" marT="9525" marB="0" anchor="b"/>
+                </a:tc>
+                <a:tc>
+                  <a:txBody>
+                    <a:bodyPr/>
+                    <a:lstStyle/>
+                    <a:p>
+                      <a:pPr algn="l" fontAlgn="b"/>
+                      <a:r>
+                        <a:rPr lang="en-US" sz="2000" u="none" strike="noStrike">
+                          <a:effectLst/>
+                        </a:rPr>
+                        <a:t>1</a:t>
                       </a:r>
                       <a:endParaRPr lang="en-US" sz="2000" b="0" i="0" u="none" strike="noStrike">
                         <a:solidFill>
@@ -9040,6 +8098,29 @@
                         <a:rPr lang="en-US" sz="2000" u="none" strike="noStrike">
                           <a:effectLst/>
                         </a:rPr>
+                        <a:t>0</a:t>
+                      </a:r>
+                      <a:endParaRPr lang="en-US" sz="2000" b="0" i="0" u="none" strike="noStrike">
+                        <a:solidFill>
+                          <a:srgbClr val="000000"/>
+                        </a:solidFill>
+                        <a:effectLst/>
+                        <a:latin typeface="Calibri"/>
+                      </a:endParaRPr>
+                    </a:p>
+                  </a:txBody>
+                  <a:tcPr marL="9525" marR="9525" marT="9525" marB="0" anchor="b"/>
+                </a:tc>
+                <a:tc>
+                  <a:txBody>
+                    <a:bodyPr/>
+                    <a:lstStyle/>
+                    <a:p>
+                      <a:pPr algn="l" fontAlgn="b"/>
+                      <a:r>
+                        <a:rPr lang="en-US" sz="2000" u="none" strike="noStrike">
+                          <a:effectLst/>
+                        </a:rPr>
                         <a:t>1</a:t>
                       </a:r>
                       <a:endParaRPr lang="en-US" sz="2000" b="0" i="0" u="none" strike="noStrike">
@@ -9063,52 +8144,6 @@
                         <a:rPr lang="en-US" sz="2000" u="none" strike="noStrike">
                           <a:effectLst/>
                         </a:rPr>
-                        <a:t>3</a:t>
-                      </a:r>
-                      <a:endParaRPr lang="en-US" sz="2000" b="0" i="0" u="none" strike="noStrike">
-                        <a:solidFill>
-                          <a:srgbClr val="000000"/>
-                        </a:solidFill>
-                        <a:effectLst/>
-                        <a:latin typeface="Calibri"/>
-                      </a:endParaRPr>
-                    </a:p>
-                  </a:txBody>
-                  <a:tcPr marL="9525" marR="9525" marT="9525" marB="0" anchor="b"/>
-                </a:tc>
-                <a:tc>
-                  <a:txBody>
-                    <a:bodyPr/>
-                    <a:lstStyle/>
-                    <a:p>
-                      <a:pPr algn="l" fontAlgn="b"/>
-                      <a:r>
-                        <a:rPr lang="en-US" sz="2000" u="none" strike="noStrike">
-                          <a:effectLst/>
-                        </a:rPr>
-                        <a:t>3</a:t>
-                      </a:r>
-                      <a:endParaRPr lang="en-US" sz="2000" b="0" i="0" u="none" strike="noStrike">
-                        <a:solidFill>
-                          <a:srgbClr val="000000"/>
-                        </a:solidFill>
-                        <a:effectLst/>
-                        <a:latin typeface="Calibri"/>
-                      </a:endParaRPr>
-                    </a:p>
-                  </a:txBody>
-                  <a:tcPr marL="9525" marR="9525" marT="9525" marB="0" anchor="b"/>
-                </a:tc>
-                <a:tc>
-                  <a:txBody>
-                    <a:bodyPr/>
-                    <a:lstStyle/>
-                    <a:p>
-                      <a:pPr algn="l" fontAlgn="b"/>
-                      <a:r>
-                        <a:rPr lang="en-US" sz="2000" u="none" strike="noStrike">
-                          <a:effectLst/>
-                        </a:rPr>
                         <a:t>1</a:t>
                       </a:r>
                       <a:endParaRPr lang="en-US" sz="2000" b="0" i="0" u="none" strike="noStrike">
@@ -9132,30 +8167,53 @@
                         <a:rPr lang="en-US" sz="2000" u="none" strike="noStrike">
                           <a:effectLst/>
                         </a:rPr>
+                        <a:t>0</a:t>
+                      </a:r>
+                      <a:endParaRPr lang="en-US" sz="2000" b="0" i="0" u="none" strike="noStrike">
+                        <a:solidFill>
+                          <a:srgbClr val="000000"/>
+                        </a:solidFill>
+                        <a:effectLst/>
+                        <a:latin typeface="Calibri"/>
+                      </a:endParaRPr>
+                    </a:p>
+                  </a:txBody>
+                  <a:tcPr marL="9525" marR="9525" marT="9525" marB="0" anchor="b"/>
+                </a:tc>
+                <a:tc>
+                  <a:txBody>
+                    <a:bodyPr/>
+                    <a:lstStyle/>
+                    <a:p>
+                      <a:pPr algn="l" fontAlgn="b"/>
+                      <a:r>
+                        <a:rPr lang="en-US" sz="2000" u="none" strike="noStrike">
+                          <a:effectLst/>
+                        </a:rPr>
+                        <a:t>0</a:t>
+                      </a:r>
+                      <a:endParaRPr lang="en-US" sz="2000" b="0" i="0" u="none" strike="noStrike">
+                        <a:solidFill>
+                          <a:srgbClr val="000000"/>
+                        </a:solidFill>
+                        <a:effectLst/>
+                        <a:latin typeface="Calibri"/>
+                      </a:endParaRPr>
+                    </a:p>
+                  </a:txBody>
+                  <a:tcPr marL="9525" marR="9525" marT="9525" marB="0" anchor="b"/>
+                </a:tc>
+                <a:tc>
+                  <a:txBody>
+                    <a:bodyPr/>
+                    <a:lstStyle/>
+                    <a:p>
+                      <a:pPr algn="l" fontAlgn="b"/>
+                      <a:r>
+                        <a:rPr lang="en-US" sz="2000" u="none" strike="noStrike">
+                          <a:effectLst/>
+                        </a:rPr>
                         <a:t>2</a:t>
-                      </a:r>
-                      <a:endParaRPr lang="en-US" sz="2000" b="0" i="0" u="none" strike="noStrike">
-                        <a:solidFill>
-                          <a:srgbClr val="000000"/>
-                        </a:solidFill>
-                        <a:effectLst/>
-                        <a:latin typeface="Calibri"/>
-                      </a:endParaRPr>
-                    </a:p>
-                  </a:txBody>
-                  <a:tcPr marL="9525" marR="9525" marT="9525" marB="0" anchor="b"/>
-                </a:tc>
-                <a:tc>
-                  <a:txBody>
-                    <a:bodyPr/>
-                    <a:lstStyle/>
-                    <a:p>
-                      <a:pPr algn="l" fontAlgn="b"/>
-                      <a:r>
-                        <a:rPr lang="en-US" sz="2000" u="none" strike="noStrike">
-                          <a:effectLst/>
-                        </a:rPr>
-                        <a:t>1</a:t>
                       </a:r>
                       <a:endParaRPr lang="en-US" sz="2000" b="0" i="0" u="none" strike="noStrike">
                         <a:solidFill>
@@ -9180,6 +8238,52 @@
                         <a:rPr lang="en-US" sz="2000" u="none" strike="noStrike">
                           <a:effectLst/>
                         </a:rPr>
+                        <a:t>0</a:t>
+                      </a:r>
+                      <a:endParaRPr lang="en-US" sz="2000" b="0" i="0" u="none" strike="noStrike">
+                        <a:solidFill>
+                          <a:srgbClr val="000000"/>
+                        </a:solidFill>
+                        <a:effectLst/>
+                        <a:latin typeface="Calibri"/>
+                      </a:endParaRPr>
+                    </a:p>
+                  </a:txBody>
+                  <a:tcPr marL="9525" marR="9525" marT="9525" marB="0" anchor="b"/>
+                </a:tc>
+                <a:tc>
+                  <a:txBody>
+                    <a:bodyPr/>
+                    <a:lstStyle/>
+                    <a:p>
+                      <a:pPr algn="l" fontAlgn="b"/>
+                      <a:r>
+                        <a:rPr lang="en-US" sz="2000" u="none" strike="noStrike">
+                          <a:effectLst/>
+                        </a:rPr>
+                        <a:t>0</a:t>
+                      </a:r>
+                      <a:endParaRPr lang="en-US" sz="2000" b="0" i="0" u="none" strike="noStrike">
+                        <a:solidFill>
+                          <a:srgbClr val="000000"/>
+                        </a:solidFill>
+                        <a:effectLst/>
+                        <a:latin typeface="Calibri"/>
+                      </a:endParaRPr>
+                    </a:p>
+                  </a:txBody>
+                  <a:tcPr marL="9525" marR="9525" marT="9525" marB="0" anchor="b"/>
+                </a:tc>
+                <a:tc>
+                  <a:txBody>
+                    <a:bodyPr/>
+                    <a:lstStyle/>
+                    <a:p>
+                      <a:pPr algn="l" fontAlgn="b"/>
+                      <a:r>
+                        <a:rPr lang="en-US" sz="2000" u="none" strike="noStrike">
+                          <a:effectLst/>
+                        </a:rPr>
                         <a:t>2</a:t>
                       </a:r>
                       <a:endParaRPr lang="en-US" sz="2000" b="0" i="0" u="none" strike="noStrike">
@@ -9203,29 +8307,6 @@
                         <a:rPr lang="en-US" sz="2000" u="none" strike="noStrike">
                           <a:effectLst/>
                         </a:rPr>
-                        <a:t>1</a:t>
-                      </a:r>
-                      <a:endParaRPr lang="en-US" sz="2000" b="0" i="0" u="none" strike="noStrike">
-                        <a:solidFill>
-                          <a:srgbClr val="000000"/>
-                        </a:solidFill>
-                        <a:effectLst/>
-                        <a:latin typeface="Calibri"/>
-                      </a:endParaRPr>
-                    </a:p>
-                  </a:txBody>
-                  <a:tcPr marL="9525" marR="9525" marT="9525" marB="0" anchor="b"/>
-                </a:tc>
-                <a:tc>
-                  <a:txBody>
-                    <a:bodyPr/>
-                    <a:lstStyle/>
-                    <a:p>
-                      <a:pPr algn="l" fontAlgn="b"/>
-                      <a:r>
-                        <a:rPr lang="en-US" sz="2000" u="none" strike="noStrike">
-                          <a:effectLst/>
-                        </a:rPr>
                         <a:t>2</a:t>
                       </a:r>
                       <a:endParaRPr lang="en-US" sz="2000" b="0" i="0" u="none" strike="noStrike">
@@ -9249,30 +8330,7 @@
                         <a:rPr lang="en-US" sz="2000" u="none" strike="noStrike">
                           <a:effectLst/>
                         </a:rPr>
-                        <a:t>2</a:t>
-                      </a:r>
-                      <a:endParaRPr lang="en-US" sz="2000" b="0" i="0" u="none" strike="noStrike">
-                        <a:solidFill>
-                          <a:srgbClr val="000000"/>
-                        </a:solidFill>
-                        <a:effectLst/>
-                        <a:latin typeface="Calibri"/>
-                      </a:endParaRPr>
-                    </a:p>
-                  </a:txBody>
-                  <a:tcPr marL="9525" marR="9525" marT="9525" marB="0" anchor="b"/>
-                </a:tc>
-                <a:tc>
-                  <a:txBody>
-                    <a:bodyPr/>
-                    <a:lstStyle/>
-                    <a:p>
-                      <a:pPr algn="l" fontAlgn="b"/>
-                      <a:r>
-                        <a:rPr lang="en-US" sz="2000" u="none" strike="noStrike">
-                          <a:effectLst/>
-                        </a:rPr>
-                        <a:t>1</a:t>
+                        <a:t>0</a:t>
                       </a:r>
                       <a:endParaRPr lang="en-US" sz="2000" b="0" i="0" u="none" strike="noStrike">
                         <a:solidFill>
@@ -9343,29 +8401,6 @@
                         <a:rPr lang="en-US" sz="2000" u="none" strike="noStrike">
                           <a:effectLst/>
                         </a:rPr>
-                        <a:t>1</a:t>
-                      </a:r>
-                      <a:endParaRPr lang="en-US" sz="2000" b="0" i="0" u="none" strike="noStrike">
-                        <a:solidFill>
-                          <a:srgbClr val="000000"/>
-                        </a:solidFill>
-                        <a:effectLst/>
-                        <a:latin typeface="Calibri"/>
-                      </a:endParaRPr>
-                    </a:p>
-                  </a:txBody>
-                  <a:tcPr marL="9525" marR="9525" marT="9525" marB="0" anchor="b"/>
-                </a:tc>
-                <a:tc>
-                  <a:txBody>
-                    <a:bodyPr/>
-                    <a:lstStyle/>
-                    <a:p>
-                      <a:pPr algn="l" fontAlgn="b"/>
-                      <a:r>
-                        <a:rPr lang="en-US" sz="2000" u="none" strike="noStrike">
-                          <a:effectLst/>
-                        </a:rPr>
                         <a:t>0</a:t>
                       </a:r>
                       <a:endParaRPr lang="en-US" sz="2000" b="0" i="0" u="none" strike="noStrike">
@@ -9389,52 +8424,6 @@
                         <a:rPr lang="en-US" sz="2000" u="none" strike="noStrike">
                           <a:effectLst/>
                         </a:rPr>
-                        <a:t>1</a:t>
-                      </a:r>
-                      <a:endParaRPr lang="en-US" sz="2000" b="0" i="0" u="none" strike="noStrike">
-                        <a:solidFill>
-                          <a:srgbClr val="000000"/>
-                        </a:solidFill>
-                        <a:effectLst/>
-                        <a:latin typeface="Calibri"/>
-                      </a:endParaRPr>
-                    </a:p>
-                  </a:txBody>
-                  <a:tcPr marL="9525" marR="9525" marT="9525" marB="0" anchor="b"/>
-                </a:tc>
-                <a:tc>
-                  <a:txBody>
-                    <a:bodyPr/>
-                    <a:lstStyle/>
-                    <a:p>
-                      <a:pPr algn="l" fontAlgn="b"/>
-                      <a:r>
-                        <a:rPr lang="en-US" sz="2000" u="none" strike="noStrike">
-                          <a:effectLst/>
-                        </a:rPr>
-                        <a:t>1</a:t>
-                      </a:r>
-                      <a:endParaRPr lang="en-US" sz="2000" b="0" i="0" u="none" strike="noStrike">
-                        <a:solidFill>
-                          <a:srgbClr val="000000"/>
-                        </a:solidFill>
-                        <a:effectLst/>
-                        <a:latin typeface="Calibri"/>
-                      </a:endParaRPr>
-                    </a:p>
-                  </a:txBody>
-                  <a:tcPr marL="9525" marR="9525" marT="9525" marB="0" anchor="b"/>
-                </a:tc>
-                <a:tc>
-                  <a:txBody>
-                    <a:bodyPr/>
-                    <a:lstStyle/>
-                    <a:p>
-                      <a:pPr algn="l" fontAlgn="b"/>
-                      <a:r>
-                        <a:rPr lang="en-US" sz="2000" u="none" strike="noStrike">
-                          <a:effectLst/>
-                        </a:rPr>
                         <a:t>0</a:t>
                       </a:r>
                       <a:endParaRPr lang="en-US" sz="2000" b="0" i="0" u="none" strike="noStrike">
@@ -9458,6 +8447,52 @@
                         <a:rPr lang="en-US" sz="2000" u="none" strike="noStrike">
                           <a:effectLst/>
                         </a:rPr>
+                        <a:t>3</a:t>
+                      </a:r>
+                      <a:endParaRPr lang="en-US" sz="2000" b="0" i="0" u="none" strike="noStrike">
+                        <a:solidFill>
+                          <a:srgbClr val="000000"/>
+                        </a:solidFill>
+                        <a:effectLst/>
+                        <a:latin typeface="Calibri"/>
+                      </a:endParaRPr>
+                    </a:p>
+                  </a:txBody>
+                  <a:tcPr marL="9525" marR="9525" marT="9525" marB="0" anchor="b"/>
+                </a:tc>
+                <a:tc>
+                  <a:txBody>
+                    <a:bodyPr/>
+                    <a:lstStyle/>
+                    <a:p>
+                      <a:pPr algn="l" fontAlgn="b"/>
+                      <a:r>
+                        <a:rPr lang="en-US" sz="2000" u="none" strike="noStrike">
+                          <a:effectLst/>
+                        </a:rPr>
+                        <a:t>3</a:t>
+                      </a:r>
+                      <a:endParaRPr lang="en-US" sz="2000" b="0" i="0" u="none" strike="noStrike">
+                        <a:solidFill>
+                          <a:srgbClr val="000000"/>
+                        </a:solidFill>
+                        <a:effectLst/>
+                        <a:latin typeface="Calibri"/>
+                      </a:endParaRPr>
+                    </a:p>
+                  </a:txBody>
+                  <a:tcPr marL="9525" marR="9525" marT="9525" marB="0" anchor="b"/>
+                </a:tc>
+                <a:tc>
+                  <a:txBody>
+                    <a:bodyPr/>
+                    <a:lstStyle/>
+                    <a:p>
+                      <a:pPr algn="l" fontAlgn="b"/>
+                      <a:r>
+                        <a:rPr lang="en-US" sz="2000" u="none" strike="noStrike">
+                          <a:effectLst/>
+                        </a:rPr>
                         <a:t>0</a:t>
                       </a:r>
                       <a:endParaRPr lang="en-US" sz="2000" b="0" i="0" u="none" strike="noStrike">
@@ -9481,822 +8516,30 @@
                         <a:rPr lang="en-US" sz="2000" u="none" strike="noStrike">
                           <a:effectLst/>
                         </a:rPr>
+                        <a:t>0</a:t>
+                      </a:r>
+                      <a:endParaRPr lang="en-US" sz="2000" b="0" i="0" u="none" strike="noStrike">
+                        <a:solidFill>
+                          <a:srgbClr val="000000"/>
+                        </a:solidFill>
+                        <a:effectLst/>
+                        <a:latin typeface="Calibri"/>
+                      </a:endParaRPr>
+                    </a:p>
+                  </a:txBody>
+                  <a:tcPr marL="9525" marR="9525" marT="9525" marB="0" anchor="b"/>
+                </a:tc>
+                <a:tc>
+                  <a:txBody>
+                    <a:bodyPr/>
+                    <a:lstStyle/>
+                    <a:p>
+                      <a:pPr algn="l" fontAlgn="b"/>
+                      <a:r>
+                        <a:rPr lang="en-US" sz="2000" u="none" strike="noStrike" dirty="0">
+                          <a:effectLst/>
+                        </a:rPr>
                         <a:t>2</a:t>
-                      </a:r>
-                      <a:endParaRPr lang="en-US" sz="2000" b="0" i="0" u="none" strike="noStrike">
-                        <a:solidFill>
-                          <a:srgbClr val="000000"/>
-                        </a:solidFill>
-                        <a:effectLst/>
-                        <a:latin typeface="Calibri"/>
-                      </a:endParaRPr>
-                    </a:p>
-                  </a:txBody>
-                  <a:tcPr marL="9525" marR="9525" marT="9525" marB="0" anchor="b"/>
-                </a:tc>
-              </a:tr>
-              <a:tr h="333375">
-                <a:tc>
-                  <a:txBody>
-                    <a:bodyPr/>
-                    <a:lstStyle/>
-                    <a:p>
-                      <a:pPr algn="l" fontAlgn="b"/>
-                      <a:r>
-                        <a:rPr lang="en-US" sz="2000" u="none" strike="noStrike">
-                          <a:effectLst/>
-                        </a:rPr>
-                        <a:t>0</a:t>
-                      </a:r>
-                      <a:endParaRPr lang="en-US" sz="2000" b="0" i="0" u="none" strike="noStrike">
-                        <a:solidFill>
-                          <a:srgbClr val="000000"/>
-                        </a:solidFill>
-                        <a:effectLst/>
-                        <a:latin typeface="Calibri"/>
-                      </a:endParaRPr>
-                    </a:p>
-                  </a:txBody>
-                  <a:tcPr marL="9525" marR="9525" marT="9525" marB="0" anchor="b"/>
-                </a:tc>
-                <a:tc>
-                  <a:txBody>
-                    <a:bodyPr/>
-                    <a:lstStyle/>
-                    <a:p>
-                      <a:pPr algn="l" fontAlgn="b"/>
-                      <a:r>
-                        <a:rPr lang="en-US" sz="2000" u="none" strike="noStrike">
-                          <a:effectLst/>
-                        </a:rPr>
-                        <a:t>0</a:t>
-                      </a:r>
-                      <a:endParaRPr lang="en-US" sz="2000" b="0" i="0" u="none" strike="noStrike">
-                        <a:solidFill>
-                          <a:srgbClr val="000000"/>
-                        </a:solidFill>
-                        <a:effectLst/>
-                        <a:latin typeface="Calibri"/>
-                      </a:endParaRPr>
-                    </a:p>
-                  </a:txBody>
-                  <a:tcPr marL="9525" marR="9525" marT="9525" marB="0" anchor="b"/>
-                </a:tc>
-                <a:tc>
-                  <a:txBody>
-                    <a:bodyPr/>
-                    <a:lstStyle/>
-                    <a:p>
-                      <a:pPr algn="l" fontAlgn="b"/>
-                      <a:r>
-                        <a:rPr lang="en-US" sz="2000" u="none" strike="noStrike">
-                          <a:effectLst/>
-                        </a:rPr>
-                        <a:t>2</a:t>
-                      </a:r>
-                      <a:endParaRPr lang="en-US" sz="2000" b="0" i="0" u="none" strike="noStrike">
-                        <a:solidFill>
-                          <a:srgbClr val="000000"/>
-                        </a:solidFill>
-                        <a:effectLst/>
-                        <a:latin typeface="Calibri"/>
-                      </a:endParaRPr>
-                    </a:p>
-                  </a:txBody>
-                  <a:tcPr marL="9525" marR="9525" marT="9525" marB="0" anchor="b"/>
-                </a:tc>
-                <a:tc>
-                  <a:txBody>
-                    <a:bodyPr/>
-                    <a:lstStyle/>
-                    <a:p>
-                      <a:pPr algn="l" fontAlgn="b"/>
-                      <a:r>
-                        <a:rPr lang="en-US" sz="2000" u="none" strike="noStrike">
-                          <a:effectLst/>
-                        </a:rPr>
-                        <a:t>2</a:t>
-                      </a:r>
-                      <a:endParaRPr lang="en-US" sz="2000" b="0" i="0" u="none" strike="noStrike">
-                        <a:solidFill>
-                          <a:srgbClr val="000000"/>
-                        </a:solidFill>
-                        <a:effectLst/>
-                        <a:latin typeface="Calibri"/>
-                      </a:endParaRPr>
-                    </a:p>
-                  </a:txBody>
-                  <a:tcPr marL="9525" marR="9525" marT="9525" marB="0" anchor="b"/>
-                </a:tc>
-                <a:tc>
-                  <a:txBody>
-                    <a:bodyPr/>
-                    <a:lstStyle/>
-                    <a:p>
-                      <a:pPr algn="l" fontAlgn="b"/>
-                      <a:r>
-                        <a:rPr lang="en-US" sz="2000" u="none" strike="noStrike">
-                          <a:effectLst/>
-                        </a:rPr>
-                        <a:t>0</a:t>
-                      </a:r>
-                      <a:endParaRPr lang="en-US" sz="2000" b="0" i="0" u="none" strike="noStrike">
-                        <a:solidFill>
-                          <a:srgbClr val="000000"/>
-                        </a:solidFill>
-                        <a:effectLst/>
-                        <a:latin typeface="Calibri"/>
-                      </a:endParaRPr>
-                    </a:p>
-                  </a:txBody>
-                  <a:tcPr marL="9525" marR="9525" marT="9525" marB="0" anchor="b"/>
-                </a:tc>
-                <a:tc>
-                  <a:txBody>
-                    <a:bodyPr/>
-                    <a:lstStyle/>
-                    <a:p>
-                      <a:pPr algn="l" fontAlgn="b"/>
-                      <a:r>
-                        <a:rPr lang="en-US" sz="2000" u="none" strike="noStrike">
-                          <a:effectLst/>
-                        </a:rPr>
-                        <a:t>0</a:t>
-                      </a:r>
-                      <a:endParaRPr lang="en-US" sz="2000" b="0" i="0" u="none" strike="noStrike">
-                        <a:solidFill>
-                          <a:srgbClr val="000000"/>
-                        </a:solidFill>
-                        <a:effectLst/>
-                        <a:latin typeface="Calibri"/>
-                      </a:endParaRPr>
-                    </a:p>
-                  </a:txBody>
-                  <a:tcPr marL="9525" marR="9525" marT="9525" marB="0" anchor="b"/>
-                </a:tc>
-                <a:tc>
-                  <a:txBody>
-                    <a:bodyPr/>
-                    <a:lstStyle/>
-                    <a:p>
-                      <a:pPr algn="l" fontAlgn="b"/>
-                      <a:r>
-                        <a:rPr lang="en-US" sz="2000" u="none" strike="noStrike">
-                          <a:effectLst/>
-                        </a:rPr>
-                        <a:t>2</a:t>
-                      </a:r>
-                      <a:endParaRPr lang="en-US" sz="2000" b="0" i="0" u="none" strike="noStrike">
-                        <a:solidFill>
-                          <a:srgbClr val="000000"/>
-                        </a:solidFill>
-                        <a:effectLst/>
-                        <a:latin typeface="Calibri"/>
-                      </a:endParaRPr>
-                    </a:p>
-                  </a:txBody>
-                  <a:tcPr marL="9525" marR="9525" marT="9525" marB="0" anchor="b"/>
-                </a:tc>
-              </a:tr>
-              <a:tr h="333375">
-                <a:tc>
-                  <a:txBody>
-                    <a:bodyPr/>
-                    <a:lstStyle/>
-                    <a:p>
-                      <a:pPr algn="l" fontAlgn="b"/>
-                      <a:r>
-                        <a:rPr lang="en-US" sz="2000" u="none" strike="noStrike">
-                          <a:effectLst/>
-                        </a:rPr>
-                        <a:t>0</a:t>
-                      </a:r>
-                      <a:endParaRPr lang="en-US" sz="2000" b="0" i="0" u="none" strike="noStrike">
-                        <a:solidFill>
-                          <a:srgbClr val="000000"/>
-                        </a:solidFill>
-                        <a:effectLst/>
-                        <a:latin typeface="Calibri"/>
-                      </a:endParaRPr>
-                    </a:p>
-                  </a:txBody>
-                  <a:tcPr marL="9525" marR="9525" marT="9525" marB="0" anchor="b"/>
-                </a:tc>
-                <a:tc>
-                  <a:txBody>
-                    <a:bodyPr/>
-                    <a:lstStyle/>
-                    <a:p>
-                      <a:pPr algn="l" fontAlgn="b"/>
-                      <a:r>
-                        <a:rPr lang="en-US" sz="2000" u="none" strike="noStrike">
-                          <a:effectLst/>
-                        </a:rPr>
-                        <a:t>0</a:t>
-                      </a:r>
-                      <a:endParaRPr lang="en-US" sz="2000" b="0" i="0" u="none" strike="noStrike">
-                        <a:solidFill>
-                          <a:srgbClr val="000000"/>
-                        </a:solidFill>
-                        <a:effectLst/>
-                        <a:latin typeface="Calibri"/>
-                      </a:endParaRPr>
-                    </a:p>
-                  </a:txBody>
-                  <a:tcPr marL="9525" marR="9525" marT="9525" marB="0" anchor="b"/>
-                </a:tc>
-                <a:tc>
-                  <a:txBody>
-                    <a:bodyPr/>
-                    <a:lstStyle/>
-                    <a:p>
-                      <a:pPr algn="l" fontAlgn="b"/>
-                      <a:r>
-                        <a:rPr lang="en-US" sz="2000" u="none" strike="noStrike">
-                          <a:effectLst/>
-                        </a:rPr>
-                        <a:t>3</a:t>
-                      </a:r>
-                      <a:endParaRPr lang="en-US" sz="2000" b="0" i="0" u="none" strike="noStrike">
-                        <a:solidFill>
-                          <a:srgbClr val="000000"/>
-                        </a:solidFill>
-                        <a:effectLst/>
-                        <a:latin typeface="Calibri"/>
-                      </a:endParaRPr>
-                    </a:p>
-                  </a:txBody>
-                  <a:tcPr marL="9525" marR="9525" marT="9525" marB="0" anchor="b"/>
-                </a:tc>
-                <a:tc>
-                  <a:txBody>
-                    <a:bodyPr/>
-                    <a:lstStyle/>
-                    <a:p>
-                      <a:pPr algn="l" fontAlgn="b"/>
-                      <a:r>
-                        <a:rPr lang="en-US" sz="2000" u="none" strike="noStrike">
-                          <a:effectLst/>
-                        </a:rPr>
-                        <a:t>3</a:t>
-                      </a:r>
-                      <a:endParaRPr lang="en-US" sz="2000" b="0" i="0" u="none" strike="noStrike">
-                        <a:solidFill>
-                          <a:srgbClr val="000000"/>
-                        </a:solidFill>
-                        <a:effectLst/>
-                        <a:latin typeface="Calibri"/>
-                      </a:endParaRPr>
-                    </a:p>
-                  </a:txBody>
-                  <a:tcPr marL="9525" marR="9525" marT="9525" marB="0" anchor="b"/>
-                </a:tc>
-                <a:tc>
-                  <a:txBody>
-                    <a:bodyPr/>
-                    <a:lstStyle/>
-                    <a:p>
-                      <a:pPr algn="l" fontAlgn="b"/>
-                      <a:r>
-                        <a:rPr lang="en-US" sz="2000" u="none" strike="noStrike">
-                          <a:effectLst/>
-                        </a:rPr>
-                        <a:t>0</a:t>
-                      </a:r>
-                      <a:endParaRPr lang="en-US" sz="2000" b="0" i="0" u="none" strike="noStrike">
-                        <a:solidFill>
-                          <a:srgbClr val="000000"/>
-                        </a:solidFill>
-                        <a:effectLst/>
-                        <a:latin typeface="Calibri"/>
-                      </a:endParaRPr>
-                    </a:p>
-                  </a:txBody>
-                  <a:tcPr marL="9525" marR="9525" marT="9525" marB="0" anchor="b"/>
-                </a:tc>
-                <a:tc>
-                  <a:txBody>
-                    <a:bodyPr/>
-                    <a:lstStyle/>
-                    <a:p>
-                      <a:pPr algn="l" fontAlgn="b"/>
-                      <a:r>
-                        <a:rPr lang="en-US" sz="2000" u="none" strike="noStrike">
-                          <a:effectLst/>
-                        </a:rPr>
-                        <a:t>0</a:t>
-                      </a:r>
-                      <a:endParaRPr lang="en-US" sz="2000" b="0" i="0" u="none" strike="noStrike">
-                        <a:solidFill>
-                          <a:srgbClr val="000000"/>
-                        </a:solidFill>
-                        <a:effectLst/>
-                        <a:latin typeface="Calibri"/>
-                      </a:endParaRPr>
-                    </a:p>
-                  </a:txBody>
-                  <a:tcPr marL="9525" marR="9525" marT="9525" marB="0" anchor="b"/>
-                </a:tc>
-                <a:tc>
-                  <a:txBody>
-                    <a:bodyPr/>
-                    <a:lstStyle/>
-                    <a:p>
-                      <a:pPr algn="l" fontAlgn="b"/>
-                      <a:r>
-                        <a:rPr lang="en-US" sz="2000" u="none" strike="noStrike">
-                          <a:effectLst/>
-                        </a:rPr>
-                        <a:t>2</a:t>
-                      </a:r>
-                      <a:endParaRPr lang="en-US" sz="2000" b="0" i="0" u="none" strike="noStrike">
-                        <a:solidFill>
-                          <a:srgbClr val="000000"/>
-                        </a:solidFill>
-                        <a:effectLst/>
-                        <a:latin typeface="Calibri"/>
-                      </a:endParaRPr>
-                    </a:p>
-                  </a:txBody>
-                  <a:tcPr marL="9525" marR="9525" marT="9525" marB="0" anchor="b"/>
-                </a:tc>
-              </a:tr>
-              <a:tr h="333375">
-                <a:tc>
-                  <a:txBody>
-                    <a:bodyPr/>
-                    <a:lstStyle/>
-                    <a:p>
-                      <a:pPr algn="l" fontAlgn="b"/>
-                      <a:r>
-                        <a:rPr lang="en-US" sz="2000" u="none" strike="noStrike">
-                          <a:effectLst/>
-                        </a:rPr>
-                        <a:t>2</a:t>
-                      </a:r>
-                      <a:endParaRPr lang="en-US" sz="2000" b="0" i="0" u="none" strike="noStrike">
-                        <a:solidFill>
-                          <a:srgbClr val="000000"/>
-                        </a:solidFill>
-                        <a:effectLst/>
-                        <a:latin typeface="Calibri"/>
-                      </a:endParaRPr>
-                    </a:p>
-                  </a:txBody>
-                  <a:tcPr marL="9525" marR="9525" marT="9525" marB="0" anchor="b"/>
-                </a:tc>
-                <a:tc>
-                  <a:txBody>
-                    <a:bodyPr/>
-                    <a:lstStyle/>
-                    <a:p>
-                      <a:pPr algn="l" fontAlgn="b"/>
-                      <a:r>
-                        <a:rPr lang="en-US" sz="2000" u="none" strike="noStrike">
-                          <a:effectLst/>
-                        </a:rPr>
-                        <a:t>0</a:t>
-                      </a:r>
-                      <a:endParaRPr lang="en-US" sz="2000" b="0" i="0" u="none" strike="noStrike">
-                        <a:solidFill>
-                          <a:srgbClr val="000000"/>
-                        </a:solidFill>
-                        <a:effectLst/>
-                        <a:latin typeface="Calibri"/>
-                      </a:endParaRPr>
-                    </a:p>
-                  </a:txBody>
-                  <a:tcPr marL="9525" marR="9525" marT="9525" marB="0" anchor="b"/>
-                </a:tc>
-                <a:tc>
-                  <a:txBody>
-                    <a:bodyPr/>
-                    <a:lstStyle/>
-                    <a:p>
-                      <a:pPr algn="l" fontAlgn="b"/>
-                      <a:r>
-                        <a:rPr lang="en-US" sz="2000" u="none" strike="noStrike">
-                          <a:effectLst/>
-                        </a:rPr>
-                        <a:t>4</a:t>
-                      </a:r>
-                      <a:endParaRPr lang="en-US" sz="2000" b="0" i="0" u="none" strike="noStrike">
-                        <a:solidFill>
-                          <a:srgbClr val="000000"/>
-                        </a:solidFill>
-                        <a:effectLst/>
-                        <a:latin typeface="Calibri"/>
-                      </a:endParaRPr>
-                    </a:p>
-                  </a:txBody>
-                  <a:tcPr marL="9525" marR="9525" marT="9525" marB="0" anchor="b"/>
-                </a:tc>
-                <a:tc>
-                  <a:txBody>
-                    <a:bodyPr/>
-                    <a:lstStyle/>
-                    <a:p>
-                      <a:pPr algn="l" fontAlgn="b"/>
-                      <a:r>
-                        <a:rPr lang="en-US" sz="2000" u="none" strike="noStrike">
-                          <a:effectLst/>
-                        </a:rPr>
-                        <a:t>3</a:t>
-                      </a:r>
-                      <a:endParaRPr lang="en-US" sz="2000" b="0" i="0" u="none" strike="noStrike">
-                        <a:solidFill>
-                          <a:srgbClr val="000000"/>
-                        </a:solidFill>
-                        <a:effectLst/>
-                        <a:latin typeface="Calibri"/>
-                      </a:endParaRPr>
-                    </a:p>
-                  </a:txBody>
-                  <a:tcPr marL="9525" marR="9525" marT="9525" marB="0" anchor="b"/>
-                </a:tc>
-                <a:tc>
-                  <a:txBody>
-                    <a:bodyPr/>
-                    <a:lstStyle/>
-                    <a:p>
-                      <a:pPr algn="l" fontAlgn="b"/>
-                      <a:r>
-                        <a:rPr lang="en-US" sz="2000" u="none" strike="noStrike">
-                          <a:effectLst/>
-                        </a:rPr>
-                        <a:t>0</a:t>
-                      </a:r>
-                      <a:endParaRPr lang="en-US" sz="2000" b="0" i="0" u="none" strike="noStrike">
-                        <a:solidFill>
-                          <a:srgbClr val="000000"/>
-                        </a:solidFill>
-                        <a:effectLst/>
-                        <a:latin typeface="Calibri"/>
-                      </a:endParaRPr>
-                    </a:p>
-                  </a:txBody>
-                  <a:tcPr marL="9525" marR="9525" marT="9525" marB="0" anchor="b"/>
-                </a:tc>
-                <a:tc>
-                  <a:txBody>
-                    <a:bodyPr/>
-                    <a:lstStyle/>
-                    <a:p>
-                      <a:pPr algn="l" fontAlgn="b"/>
-                      <a:r>
-                        <a:rPr lang="en-US" sz="2000" u="none" strike="noStrike">
-                          <a:effectLst/>
-                        </a:rPr>
-                        <a:t>0</a:t>
-                      </a:r>
-                      <a:endParaRPr lang="en-US" sz="2000" b="0" i="0" u="none" strike="noStrike">
-                        <a:solidFill>
-                          <a:srgbClr val="000000"/>
-                        </a:solidFill>
-                        <a:effectLst/>
-                        <a:latin typeface="Calibri"/>
-                      </a:endParaRPr>
-                    </a:p>
-                  </a:txBody>
-                  <a:tcPr marL="9525" marR="9525" marT="9525" marB="0" anchor="b"/>
-                </a:tc>
-                <a:tc>
-                  <a:txBody>
-                    <a:bodyPr/>
-                    <a:lstStyle/>
-                    <a:p>
-                      <a:pPr algn="l" fontAlgn="b"/>
-                      <a:r>
-                        <a:rPr lang="en-US" sz="2000" u="none" strike="noStrike">
-                          <a:effectLst/>
-                        </a:rPr>
-                        <a:t>2</a:t>
-                      </a:r>
-                      <a:endParaRPr lang="en-US" sz="2000" b="0" i="0" u="none" strike="noStrike">
-                        <a:solidFill>
-                          <a:srgbClr val="000000"/>
-                        </a:solidFill>
-                        <a:effectLst/>
-                        <a:latin typeface="Calibri"/>
-                      </a:endParaRPr>
-                    </a:p>
-                  </a:txBody>
-                  <a:tcPr marL="9525" marR="9525" marT="9525" marB="0" anchor="b"/>
-                </a:tc>
-              </a:tr>
-              <a:tr h="333375">
-                <a:tc>
-                  <a:txBody>
-                    <a:bodyPr/>
-                    <a:lstStyle/>
-                    <a:p>
-                      <a:pPr algn="l" fontAlgn="b"/>
-                      <a:r>
-                        <a:rPr lang="en-US" sz="2000" u="none" strike="noStrike">
-                          <a:effectLst/>
-                        </a:rPr>
-                        <a:t>1</a:t>
-                      </a:r>
-                      <a:endParaRPr lang="en-US" sz="2000" b="0" i="0" u="none" strike="noStrike">
-                        <a:solidFill>
-                          <a:srgbClr val="000000"/>
-                        </a:solidFill>
-                        <a:effectLst/>
-                        <a:latin typeface="Calibri"/>
-                      </a:endParaRPr>
-                    </a:p>
-                  </a:txBody>
-                  <a:tcPr marL="9525" marR="9525" marT="9525" marB="0" anchor="b"/>
-                </a:tc>
-                <a:tc>
-                  <a:txBody>
-                    <a:bodyPr/>
-                    <a:lstStyle/>
-                    <a:p>
-                      <a:pPr algn="l" fontAlgn="b"/>
-                      <a:r>
-                        <a:rPr lang="en-US" sz="2000" u="none" strike="noStrike">
-                          <a:effectLst/>
-                        </a:rPr>
-                        <a:t>1</a:t>
-                      </a:r>
-                      <a:endParaRPr lang="en-US" sz="2000" b="0" i="0" u="none" strike="noStrike">
-                        <a:solidFill>
-                          <a:srgbClr val="000000"/>
-                        </a:solidFill>
-                        <a:effectLst/>
-                        <a:latin typeface="Calibri"/>
-                      </a:endParaRPr>
-                    </a:p>
-                  </a:txBody>
-                  <a:tcPr marL="9525" marR="9525" marT="9525" marB="0" anchor="b"/>
-                </a:tc>
-                <a:tc>
-                  <a:txBody>
-                    <a:bodyPr/>
-                    <a:lstStyle/>
-                    <a:p>
-                      <a:pPr algn="l" fontAlgn="b"/>
-                      <a:r>
-                        <a:rPr lang="en-US" sz="2000" u="none" strike="noStrike">
-                          <a:effectLst/>
-                        </a:rPr>
-                        <a:t>3</a:t>
-                      </a:r>
-                      <a:endParaRPr lang="en-US" sz="2000" b="0" i="0" u="none" strike="noStrike">
-                        <a:solidFill>
-                          <a:srgbClr val="000000"/>
-                        </a:solidFill>
-                        <a:effectLst/>
-                        <a:latin typeface="Calibri"/>
-                      </a:endParaRPr>
-                    </a:p>
-                  </a:txBody>
-                  <a:tcPr marL="9525" marR="9525" marT="9525" marB="0" anchor="b"/>
-                </a:tc>
-                <a:tc>
-                  <a:txBody>
-                    <a:bodyPr/>
-                    <a:lstStyle/>
-                    <a:p>
-                      <a:pPr algn="l" fontAlgn="b"/>
-                      <a:r>
-                        <a:rPr lang="en-US" sz="2000" u="none" strike="noStrike">
-                          <a:effectLst/>
-                        </a:rPr>
-                        <a:t>3</a:t>
-                      </a:r>
-                      <a:endParaRPr lang="en-US" sz="2000" b="0" i="0" u="none" strike="noStrike">
-                        <a:solidFill>
-                          <a:srgbClr val="000000"/>
-                        </a:solidFill>
-                        <a:effectLst/>
-                        <a:latin typeface="Calibri"/>
-                      </a:endParaRPr>
-                    </a:p>
-                  </a:txBody>
-                  <a:tcPr marL="9525" marR="9525" marT="9525" marB="0" anchor="b"/>
-                </a:tc>
-                <a:tc>
-                  <a:txBody>
-                    <a:bodyPr/>
-                    <a:lstStyle/>
-                    <a:p>
-                      <a:pPr algn="l" fontAlgn="b"/>
-                      <a:r>
-                        <a:rPr lang="en-US" sz="2000" u="none" strike="noStrike">
-                          <a:effectLst/>
-                        </a:rPr>
-                        <a:t>1</a:t>
-                      </a:r>
-                      <a:endParaRPr lang="en-US" sz="2000" b="0" i="0" u="none" strike="noStrike">
-                        <a:solidFill>
-                          <a:srgbClr val="000000"/>
-                        </a:solidFill>
-                        <a:effectLst/>
-                        <a:latin typeface="Calibri"/>
-                      </a:endParaRPr>
-                    </a:p>
-                  </a:txBody>
-                  <a:tcPr marL="9525" marR="9525" marT="9525" marB="0" anchor="b"/>
-                </a:tc>
-                <a:tc>
-                  <a:txBody>
-                    <a:bodyPr/>
-                    <a:lstStyle/>
-                    <a:p>
-                      <a:pPr algn="l" fontAlgn="b"/>
-                      <a:r>
-                        <a:rPr lang="en-US" sz="2000" u="none" strike="noStrike">
-                          <a:effectLst/>
-                        </a:rPr>
-                        <a:t>2</a:t>
-                      </a:r>
-                      <a:endParaRPr lang="en-US" sz="2000" b="0" i="0" u="none" strike="noStrike">
-                        <a:solidFill>
-                          <a:srgbClr val="000000"/>
-                        </a:solidFill>
-                        <a:effectLst/>
-                        <a:latin typeface="Calibri"/>
-                      </a:endParaRPr>
-                    </a:p>
-                  </a:txBody>
-                  <a:tcPr marL="9525" marR="9525" marT="9525" marB="0" anchor="b"/>
-                </a:tc>
-                <a:tc>
-                  <a:txBody>
-                    <a:bodyPr/>
-                    <a:lstStyle/>
-                    <a:p>
-                      <a:pPr algn="l" fontAlgn="b"/>
-                      <a:r>
-                        <a:rPr lang="en-US" sz="2000" u="none" strike="noStrike">
-                          <a:effectLst/>
-                        </a:rPr>
-                        <a:t>1</a:t>
-                      </a:r>
-                      <a:endParaRPr lang="en-US" sz="2000" b="0" i="0" u="none" strike="noStrike">
-                        <a:solidFill>
-                          <a:srgbClr val="000000"/>
-                        </a:solidFill>
-                        <a:effectLst/>
-                        <a:latin typeface="Calibri"/>
-                      </a:endParaRPr>
-                    </a:p>
-                  </a:txBody>
-                  <a:tcPr marL="9525" marR="9525" marT="9525" marB="0" anchor="b"/>
-                </a:tc>
-              </a:tr>
-              <a:tr h="333375">
-                <a:tc>
-                  <a:txBody>
-                    <a:bodyPr/>
-                    <a:lstStyle/>
-                    <a:p>
-                      <a:pPr algn="l" fontAlgn="b"/>
-                      <a:r>
-                        <a:rPr lang="en-US" sz="2000" u="none" strike="noStrike">
-                          <a:effectLst/>
-                        </a:rPr>
-                        <a:t>1</a:t>
-                      </a:r>
-                      <a:endParaRPr lang="en-US" sz="2000" b="0" i="0" u="none" strike="noStrike">
-                        <a:solidFill>
-                          <a:srgbClr val="000000"/>
-                        </a:solidFill>
-                        <a:effectLst/>
-                        <a:latin typeface="Calibri"/>
-                      </a:endParaRPr>
-                    </a:p>
-                  </a:txBody>
-                  <a:tcPr marL="9525" marR="9525" marT="9525" marB="0" anchor="b"/>
-                </a:tc>
-                <a:tc>
-                  <a:txBody>
-                    <a:bodyPr/>
-                    <a:lstStyle/>
-                    <a:p>
-                      <a:pPr algn="l" fontAlgn="b"/>
-                      <a:r>
-                        <a:rPr lang="en-US" sz="2000" u="none" strike="noStrike">
-                          <a:effectLst/>
-                        </a:rPr>
-                        <a:t>1</a:t>
-                      </a:r>
-                      <a:endParaRPr lang="en-US" sz="2000" b="0" i="0" u="none" strike="noStrike">
-                        <a:solidFill>
-                          <a:srgbClr val="000000"/>
-                        </a:solidFill>
-                        <a:effectLst/>
-                        <a:latin typeface="Calibri"/>
-                      </a:endParaRPr>
-                    </a:p>
-                  </a:txBody>
-                  <a:tcPr marL="9525" marR="9525" marT="9525" marB="0" anchor="b"/>
-                </a:tc>
-                <a:tc>
-                  <a:txBody>
-                    <a:bodyPr/>
-                    <a:lstStyle/>
-                    <a:p>
-                      <a:pPr algn="l" fontAlgn="b"/>
-                      <a:r>
-                        <a:rPr lang="en-US" sz="2000" u="none" strike="noStrike">
-                          <a:effectLst/>
-                        </a:rPr>
-                        <a:t>3</a:t>
-                      </a:r>
-                      <a:endParaRPr lang="en-US" sz="2000" b="0" i="0" u="none" strike="noStrike">
-                        <a:solidFill>
-                          <a:srgbClr val="000000"/>
-                        </a:solidFill>
-                        <a:effectLst/>
-                        <a:latin typeface="Calibri"/>
-                      </a:endParaRPr>
-                    </a:p>
-                  </a:txBody>
-                  <a:tcPr marL="9525" marR="9525" marT="9525" marB="0" anchor="b"/>
-                </a:tc>
-                <a:tc>
-                  <a:txBody>
-                    <a:bodyPr/>
-                    <a:lstStyle/>
-                    <a:p>
-                      <a:pPr algn="l" fontAlgn="b"/>
-                      <a:r>
-                        <a:rPr lang="en-US" sz="2000" u="none" strike="noStrike">
-                          <a:effectLst/>
-                        </a:rPr>
-                        <a:t>3</a:t>
-                      </a:r>
-                      <a:endParaRPr lang="en-US" sz="2000" b="0" i="0" u="none" strike="noStrike">
-                        <a:solidFill>
-                          <a:srgbClr val="000000"/>
-                        </a:solidFill>
-                        <a:effectLst/>
-                        <a:latin typeface="Calibri"/>
-                      </a:endParaRPr>
-                    </a:p>
-                  </a:txBody>
-                  <a:tcPr marL="9525" marR="9525" marT="9525" marB="0" anchor="b"/>
-                </a:tc>
-                <a:tc>
-                  <a:txBody>
-                    <a:bodyPr/>
-                    <a:lstStyle/>
-                    <a:p>
-                      <a:pPr algn="l" fontAlgn="b"/>
-                      <a:r>
-                        <a:rPr lang="en-US" sz="2000" u="none" strike="noStrike">
-                          <a:effectLst/>
-                        </a:rPr>
-                        <a:t>1</a:t>
-                      </a:r>
-                      <a:endParaRPr lang="en-US" sz="2000" b="0" i="0" u="none" strike="noStrike">
-                        <a:solidFill>
-                          <a:srgbClr val="000000"/>
-                        </a:solidFill>
-                        <a:effectLst/>
-                        <a:latin typeface="Calibri"/>
-                      </a:endParaRPr>
-                    </a:p>
-                  </a:txBody>
-                  <a:tcPr marL="9525" marR="9525" marT="9525" marB="0" anchor="b"/>
-                </a:tc>
-                <a:tc>
-                  <a:txBody>
-                    <a:bodyPr/>
-                    <a:lstStyle/>
-                    <a:p>
-                      <a:pPr algn="l" fontAlgn="b"/>
-                      <a:r>
-                        <a:rPr lang="en-US" sz="2000" u="none" strike="noStrike">
-                          <a:effectLst/>
-                        </a:rPr>
-                        <a:t>1</a:t>
-                      </a:r>
-                      <a:endParaRPr lang="en-US" sz="2000" b="0" i="0" u="none" strike="noStrike">
-                        <a:solidFill>
-                          <a:srgbClr val="000000"/>
-                        </a:solidFill>
-                        <a:effectLst/>
-                        <a:latin typeface="Calibri"/>
-                      </a:endParaRPr>
-                    </a:p>
-                  </a:txBody>
-                  <a:tcPr marL="9525" marR="9525" marT="9525" marB="0" anchor="b"/>
-                </a:tc>
-                <a:tc>
-                  <a:txBody>
-                    <a:bodyPr/>
-                    <a:lstStyle/>
-                    <a:p>
-                      <a:pPr algn="l" fontAlgn="b"/>
-                      <a:r>
-                        <a:rPr lang="en-US" sz="2000" u="none" strike="noStrike" dirty="0">
-                          <a:effectLst/>
-                        </a:rPr>
-                        <a:t>3</a:t>
                       </a:r>
                       <a:endParaRPr lang="en-US" sz="2000" b="0" i="0" u="none" strike="noStrike" dirty="0">
                         <a:solidFill>
@@ -10411,13 +8654,8 @@
           <a:p>
             <a:r>
               <a:rPr lang="en-US" dirty="0" smtClean="0"/>
-              <a:t>Other ideas (didn’t have time to try them)</a:t>
-            </a:r>
-            <a:r>
-              <a:rPr lang="en-US" dirty="0" smtClean="0"/>
-              <a:t>:</a:t>
-            </a:r>
-            <a:endParaRPr lang="en-US" dirty="0" smtClean="0"/>
+              <a:t>Other ideas (didn’t have time to try them):</a:t>
+            </a:r>
           </a:p>
           <a:p>
             <a:pPr lvl="1"/>
@@ -10436,13 +8674,8 @@
           <a:p>
             <a:r>
               <a:rPr lang="en-US" dirty="0" smtClean="0"/>
-              <a:t>Top competitors are likely using an ensemble of models that incorporates this </a:t>
-            </a:r>
-            <a:r>
-              <a:rPr lang="en-US" dirty="0" smtClean="0"/>
-              <a:t>approach</a:t>
-            </a:r>
-            <a:endParaRPr lang="en-US" dirty="0" smtClean="0"/>
+              <a:t>Top competitors are likely using an ensemble of models that incorporates this approach</a:t>
+            </a:r>
           </a:p>
         </p:txBody>
       </p:sp>
@@ -10763,11 +8996,7 @@
           <a:p>
             <a:r>
               <a:rPr lang="en-US" dirty="0" smtClean="0"/>
-              <a:t>Problem </a:t>
-            </a:r>
-            <a:r>
-              <a:rPr lang="en-US" dirty="0" smtClean="0"/>
-              <a:t>context</a:t>
+              <a:t>Problem context</a:t>
             </a:r>
             <a:endParaRPr lang="en-US" dirty="0"/>
           </a:p>
@@ -12721,11 +10950,7 @@
           <a:p>
             <a:r>
               <a:rPr lang="en-US" dirty="0" smtClean="0"/>
-              <a:t>Another </a:t>
-            </a:r>
-            <a:r>
-              <a:rPr lang="en-US" dirty="0" smtClean="0"/>
-              <a:t>example</a:t>
+              <a:t>Another example</a:t>
             </a:r>
             <a:endParaRPr lang="en-US" dirty="0"/>
           </a:p>
@@ -14574,11 +12799,7 @@
           <a:p>
             <a:r>
               <a:rPr lang="en-US" dirty="0" smtClean="0"/>
-              <a:t>Options </a:t>
-            </a:r>
-            <a:r>
-              <a:rPr lang="en-US" dirty="0" smtClean="0"/>
-              <a:t>are not identified as to their meaning</a:t>
+              <a:t>Options are not identified as to their meaning</a:t>
             </a:r>
             <a:endParaRPr lang="en-US" dirty="0"/>
           </a:p>
@@ -14680,15 +12901,7 @@
           <a:p>
             <a:r>
               <a:rPr lang="en-US" dirty="0" smtClean="0"/>
-              <a:t>Bad news: Everyone figured out this strategy (</a:t>
-            </a:r>
-            <a:r>
-              <a:rPr lang="en-US" dirty="0" smtClean="0"/>
-              <a:t>46% </a:t>
-            </a:r>
-            <a:r>
-              <a:rPr lang="en-US" dirty="0" smtClean="0"/>
-              <a:t>of competitors have that identical score)</a:t>
+              <a:t>Bad news: Everyone figured out this strategy (46% of competitors have that identical score)</a:t>
             </a:r>
             <a:endParaRPr lang="en-US" dirty="0"/>
           </a:p>

</xml_diff>